<commit_message>
[NEW] Personnal Generic VCD Scanner for Verilator. [CLEAN] Common HDL / Software folders. [ADD] Work on GPU : far from complete. [ADD] Work on SPU : far from complete. (GTE stuff not building, avoid to commit)
</commit_message>
<xml_diff>
--- a/hdlGPU/doc/PixelPipeline.pptx
+++ b/hdlGPU/doc/PixelPipeline.pptx
@@ -5,10 +5,11 @@
     <p:sldMasterId id="2147483648" r:id="rId1"/>
   </p:sldMasterIdLst>
   <p:notesMasterIdLst>
-    <p:notesMasterId r:id="rId3"/>
+    <p:notesMasterId r:id="rId4"/>
   </p:notesMasterIdLst>
   <p:sldIdLst>
     <p:sldId id="256" r:id="rId2"/>
+    <p:sldId id="257" r:id="rId3"/>
   </p:sldIdLst>
   <p:sldSz cx="9144000" cy="6858000" type="screen4x3"/>
   <p:notesSz cx="6858000" cy="9144000"/>
@@ -192,7 +193,8 @@
           <a:p>
             <a:fld id="{C052AE38-D59F-48A8-9A0F-289367896B14}" type="datetimeFigureOut">
               <a:rPr kumimoji="1" lang="en-US" smtClean="0"/>
-              <a:t>8/25/2019</a:t>
+              <a:pPr/>
+              <a:t>10/1/2019</a:t>
             </a:fld>
             <a:endParaRPr kumimoji="1" lang="en-US"/>
           </a:p>
@@ -353,6 +355,7 @@
           <a:p>
             <a:fld id="{D815809D-C2FA-420E-85F2-766FEFD3741C}" type="slidenum">
               <a:rPr kumimoji="1" lang="en-US" smtClean="0"/>
+              <a:pPr/>
               <a:t>‹#›</a:t>
             </a:fld>
             <a:endParaRPr kumimoji="1" lang="en-US"/>
@@ -611,6 +614,7 @@
           <a:p>
             <a:fld id="{D815809D-C2FA-420E-85F2-766FEFD3741C}" type="slidenum">
               <a:rPr kumimoji="1" lang="en-US" smtClean="0"/>
+              <a:pPr/>
               <a:t>1</a:t>
             </a:fld>
             <a:endParaRPr kumimoji="1" lang="en-US"/>
@@ -806,7 +810,8 @@
           <a:p>
             <a:fld id="{443C613D-398D-48F4-958F-9A4A8112E92D}" type="datetimeFigureOut">
               <a:rPr kumimoji="1" lang="en-US" smtClean="0"/>
-              <a:t>8/25/2019</a:t>
+              <a:pPr/>
+              <a:t>10/1/2019</a:t>
             </a:fld>
             <a:endParaRPr kumimoji="1" lang="en-US"/>
           </a:p>
@@ -848,6 +853,7 @@
           <a:p>
             <a:fld id="{38E5FCE4-2E4D-4176-B9BC-1537BE3365EB}" type="slidenum">
               <a:rPr kumimoji="1" lang="en-US" smtClean="0"/>
+              <a:pPr/>
               <a:t>‹#›</a:t>
             </a:fld>
             <a:endParaRPr kumimoji="1" lang="en-US"/>
@@ -971,7 +977,8 @@
           <a:p>
             <a:fld id="{443C613D-398D-48F4-958F-9A4A8112E92D}" type="datetimeFigureOut">
               <a:rPr kumimoji="1" lang="en-US" smtClean="0"/>
-              <a:t>8/25/2019</a:t>
+              <a:pPr/>
+              <a:t>10/1/2019</a:t>
             </a:fld>
             <a:endParaRPr kumimoji="1" lang="en-US"/>
           </a:p>
@@ -1013,6 +1020,7 @@
           <a:p>
             <a:fld id="{38E5FCE4-2E4D-4176-B9BC-1537BE3365EB}" type="slidenum">
               <a:rPr kumimoji="1" lang="en-US" smtClean="0"/>
+              <a:pPr/>
               <a:t>‹#›</a:t>
             </a:fld>
             <a:endParaRPr kumimoji="1" lang="en-US"/>
@@ -1146,7 +1154,8 @@
           <a:p>
             <a:fld id="{443C613D-398D-48F4-958F-9A4A8112E92D}" type="datetimeFigureOut">
               <a:rPr kumimoji="1" lang="en-US" smtClean="0"/>
-              <a:t>8/25/2019</a:t>
+              <a:pPr/>
+              <a:t>10/1/2019</a:t>
             </a:fld>
             <a:endParaRPr kumimoji="1" lang="en-US"/>
           </a:p>
@@ -1188,6 +1197,7 @@
           <a:p>
             <a:fld id="{38E5FCE4-2E4D-4176-B9BC-1537BE3365EB}" type="slidenum">
               <a:rPr kumimoji="1" lang="en-US" smtClean="0"/>
+              <a:pPr/>
               <a:t>‹#›</a:t>
             </a:fld>
             <a:endParaRPr kumimoji="1" lang="en-US"/>
@@ -1311,7 +1321,8 @@
           <a:p>
             <a:fld id="{443C613D-398D-48F4-958F-9A4A8112E92D}" type="datetimeFigureOut">
               <a:rPr kumimoji="1" lang="en-US" smtClean="0"/>
-              <a:t>8/25/2019</a:t>
+              <a:pPr/>
+              <a:t>10/1/2019</a:t>
             </a:fld>
             <a:endParaRPr kumimoji="1" lang="en-US"/>
           </a:p>
@@ -1353,6 +1364,7 @@
           <a:p>
             <a:fld id="{38E5FCE4-2E4D-4176-B9BC-1537BE3365EB}" type="slidenum">
               <a:rPr kumimoji="1" lang="en-US" smtClean="0"/>
+              <a:pPr/>
               <a:t>‹#›</a:t>
             </a:fld>
             <a:endParaRPr kumimoji="1" lang="en-US"/>
@@ -1552,7 +1564,8 @@
           <a:p>
             <a:fld id="{443C613D-398D-48F4-958F-9A4A8112E92D}" type="datetimeFigureOut">
               <a:rPr kumimoji="1" lang="en-US" smtClean="0"/>
-              <a:t>8/25/2019</a:t>
+              <a:pPr/>
+              <a:t>10/1/2019</a:t>
             </a:fld>
             <a:endParaRPr kumimoji="1" lang="en-US"/>
           </a:p>
@@ -1594,6 +1607,7 @@
           <a:p>
             <a:fld id="{38E5FCE4-2E4D-4176-B9BC-1537BE3365EB}" type="slidenum">
               <a:rPr kumimoji="1" lang="en-US" smtClean="0"/>
+              <a:pPr/>
               <a:t>‹#›</a:t>
             </a:fld>
             <a:endParaRPr kumimoji="1" lang="en-US"/>
@@ -1835,7 +1849,8 @@
           <a:p>
             <a:fld id="{443C613D-398D-48F4-958F-9A4A8112E92D}" type="datetimeFigureOut">
               <a:rPr kumimoji="1" lang="en-US" smtClean="0"/>
-              <a:t>8/25/2019</a:t>
+              <a:pPr/>
+              <a:t>10/1/2019</a:t>
             </a:fld>
             <a:endParaRPr kumimoji="1" lang="en-US"/>
           </a:p>
@@ -1877,6 +1892,7 @@
           <a:p>
             <a:fld id="{38E5FCE4-2E4D-4176-B9BC-1537BE3365EB}" type="slidenum">
               <a:rPr kumimoji="1" lang="en-US" smtClean="0"/>
+              <a:pPr/>
               <a:t>‹#›</a:t>
             </a:fld>
             <a:endParaRPr kumimoji="1" lang="en-US"/>
@@ -2252,7 +2268,8 @@
           <a:p>
             <a:fld id="{443C613D-398D-48F4-958F-9A4A8112E92D}" type="datetimeFigureOut">
               <a:rPr kumimoji="1" lang="en-US" smtClean="0"/>
-              <a:t>8/25/2019</a:t>
+              <a:pPr/>
+              <a:t>10/1/2019</a:t>
             </a:fld>
             <a:endParaRPr kumimoji="1" lang="en-US"/>
           </a:p>
@@ -2294,6 +2311,7 @@
           <a:p>
             <a:fld id="{38E5FCE4-2E4D-4176-B9BC-1537BE3365EB}" type="slidenum">
               <a:rPr kumimoji="1" lang="en-US" smtClean="0"/>
+              <a:pPr/>
               <a:t>‹#›</a:t>
             </a:fld>
             <a:endParaRPr kumimoji="1" lang="en-US"/>
@@ -2365,7 +2383,8 @@
           <a:p>
             <a:fld id="{443C613D-398D-48F4-958F-9A4A8112E92D}" type="datetimeFigureOut">
               <a:rPr kumimoji="1" lang="en-US" smtClean="0"/>
-              <a:t>8/25/2019</a:t>
+              <a:pPr/>
+              <a:t>10/1/2019</a:t>
             </a:fld>
             <a:endParaRPr kumimoji="1" lang="en-US"/>
           </a:p>
@@ -2407,6 +2426,7 @@
           <a:p>
             <a:fld id="{38E5FCE4-2E4D-4176-B9BC-1537BE3365EB}" type="slidenum">
               <a:rPr kumimoji="1" lang="en-US" smtClean="0"/>
+              <a:pPr/>
               <a:t>‹#›</a:t>
             </a:fld>
             <a:endParaRPr kumimoji="1" lang="en-US"/>
@@ -2455,7 +2475,8 @@
           <a:p>
             <a:fld id="{443C613D-398D-48F4-958F-9A4A8112E92D}" type="datetimeFigureOut">
               <a:rPr kumimoji="1" lang="en-US" smtClean="0"/>
-              <a:t>8/25/2019</a:t>
+              <a:pPr/>
+              <a:t>10/1/2019</a:t>
             </a:fld>
             <a:endParaRPr kumimoji="1" lang="en-US"/>
           </a:p>
@@ -2497,6 +2518,7 @@
           <a:p>
             <a:fld id="{38E5FCE4-2E4D-4176-B9BC-1537BE3365EB}" type="slidenum">
               <a:rPr kumimoji="1" lang="en-US" smtClean="0"/>
+              <a:pPr/>
               <a:t>‹#›</a:t>
             </a:fld>
             <a:endParaRPr kumimoji="1" lang="en-US"/>
@@ -2727,7 +2749,8 @@
           <a:p>
             <a:fld id="{443C613D-398D-48F4-958F-9A4A8112E92D}" type="datetimeFigureOut">
               <a:rPr kumimoji="1" lang="en-US" smtClean="0"/>
-              <a:t>8/25/2019</a:t>
+              <a:pPr/>
+              <a:t>10/1/2019</a:t>
             </a:fld>
             <a:endParaRPr kumimoji="1" lang="en-US"/>
           </a:p>
@@ -2769,6 +2792,7 @@
           <a:p>
             <a:fld id="{38E5FCE4-2E4D-4176-B9BC-1537BE3365EB}" type="slidenum">
               <a:rPr kumimoji="1" lang="en-US" smtClean="0"/>
+              <a:pPr/>
               <a:t>‹#›</a:t>
             </a:fld>
             <a:endParaRPr kumimoji="1" lang="en-US"/>
@@ -2975,7 +2999,8 @@
           <a:p>
             <a:fld id="{443C613D-398D-48F4-958F-9A4A8112E92D}" type="datetimeFigureOut">
               <a:rPr kumimoji="1" lang="en-US" smtClean="0"/>
-              <a:t>8/25/2019</a:t>
+              <a:pPr/>
+              <a:t>10/1/2019</a:t>
             </a:fld>
             <a:endParaRPr kumimoji="1" lang="en-US"/>
           </a:p>
@@ -3017,6 +3042,7 @@
           <a:p>
             <a:fld id="{38E5FCE4-2E4D-4176-B9BC-1537BE3365EB}" type="slidenum">
               <a:rPr kumimoji="1" lang="en-US" smtClean="0"/>
+              <a:pPr/>
               <a:t>‹#›</a:t>
             </a:fld>
             <a:endParaRPr kumimoji="1" lang="en-US"/>
@@ -3183,7 +3209,8 @@
           <a:p>
             <a:fld id="{443C613D-398D-48F4-958F-9A4A8112E92D}" type="datetimeFigureOut">
               <a:rPr kumimoji="1" lang="en-US" smtClean="0"/>
-              <a:t>8/25/2019</a:t>
+              <a:pPr/>
+              <a:t>10/1/2019</a:t>
             </a:fld>
             <a:endParaRPr kumimoji="1" lang="en-US"/>
           </a:p>
@@ -3261,6 +3288,7 @@
           <a:p>
             <a:fld id="{38E5FCE4-2E4D-4176-B9BC-1537BE3365EB}" type="slidenum">
               <a:rPr kumimoji="1" lang="en-US" smtClean="0"/>
+              <a:pPr/>
               <a:t>‹#›</a:t>
             </a:fld>
             <a:endParaRPr kumimoji="1" lang="en-US"/>
@@ -5877,6 +5905,1102 @@
               <a:t>Write On/Off</a:t>
             </a:r>
             <a:endParaRPr kumimoji="1" lang="en-US" sz="1100" dirty="0" smtClean="0"/>
+          </a:p>
+        </p:txBody>
+      </p:sp>
+    </p:spTree>
+  </p:cSld>
+  <p:clrMapOvr>
+    <a:masterClrMapping/>
+  </p:clrMapOvr>
+</p:sld>
+</file>
+
+<file path=ppt/slides/slide2.xml><?xml version="1.0" encoding="utf-8"?>
+<p:sld xmlns:a="http://schemas.openxmlformats.org/drawingml/2006/main" xmlns:r="http://schemas.openxmlformats.org/officeDocument/2006/relationships" xmlns:p="http://schemas.openxmlformats.org/presentationml/2006/main">
+  <p:cSld>
+    <p:spTree>
+      <p:nvGrpSpPr>
+        <p:cNvPr id="1" name=""/>
+        <p:cNvGrpSpPr/>
+        <p:nvPr/>
+      </p:nvGrpSpPr>
+      <p:grpSpPr>
+        <a:xfrm>
+          <a:off x="0" y="0"/>
+          <a:ext cx="0" cy="0"/>
+          <a:chOff x="0" y="0"/>
+          <a:chExt cx="0" cy="0"/>
+        </a:xfrm>
+      </p:grpSpPr>
+      <p:sp>
+        <p:nvSpPr>
+          <p:cNvPr id="21" name="Rectangle 20"/>
+          <p:cNvSpPr/>
+          <p:nvPr/>
+        </p:nvSpPr>
+        <p:spPr>
+          <a:xfrm>
+            <a:off x="76200" y="152400"/>
+            <a:ext cx="8686800" cy="1295400"/>
+          </a:xfrm>
+          <a:prstGeom prst="rect">
+            <a:avLst/>
+          </a:prstGeom>
+        </p:spPr>
+        <p:style>
+          <a:lnRef idx="2">
+            <a:schemeClr val="accent1">
+              <a:shade val="50000"/>
+            </a:schemeClr>
+          </a:lnRef>
+          <a:fillRef idx="1">
+            <a:schemeClr val="accent1"/>
+          </a:fillRef>
+          <a:effectRef idx="0">
+            <a:schemeClr val="accent1"/>
+          </a:effectRef>
+          <a:fontRef idx="minor">
+            <a:schemeClr val="lt1"/>
+          </a:fontRef>
+        </p:style>
+        <p:txBody>
+          <a:bodyPr rtlCol="0" anchor="ctr"/>
+          <a:lstStyle/>
+          <a:p>
+            <a:pPr algn="ctr"/>
+            <a:endParaRPr kumimoji="1" lang="en-US"/>
+          </a:p>
+        </p:txBody>
+      </p:sp>
+      <p:sp>
+        <p:nvSpPr>
+          <p:cNvPr id="4" name="Right Arrow 3"/>
+          <p:cNvSpPr/>
+          <p:nvPr/>
+        </p:nvSpPr>
+        <p:spPr>
+          <a:xfrm>
+            <a:off x="152400" y="3048000"/>
+            <a:ext cx="1752600" cy="533400"/>
+          </a:xfrm>
+          <a:prstGeom prst="rightArrow">
+            <a:avLst/>
+          </a:prstGeom>
+        </p:spPr>
+        <p:style>
+          <a:lnRef idx="2">
+            <a:schemeClr val="accent1">
+              <a:shade val="50000"/>
+            </a:schemeClr>
+          </a:lnRef>
+          <a:fillRef idx="1">
+            <a:schemeClr val="accent1"/>
+          </a:fillRef>
+          <a:effectRef idx="0">
+            <a:schemeClr val="accent1"/>
+          </a:effectRef>
+          <a:fontRef idx="minor">
+            <a:schemeClr val="lt1"/>
+          </a:fontRef>
+        </p:style>
+        <p:txBody>
+          <a:bodyPr rtlCol="0" anchor="ctr"/>
+          <a:lstStyle/>
+          <a:p>
+            <a:pPr algn="ctr"/>
+            <a:endParaRPr kumimoji="1" lang="en-US"/>
+          </a:p>
+        </p:txBody>
+      </p:sp>
+      <p:sp>
+        <p:nvSpPr>
+          <p:cNvPr id="5" name="TextBox 4"/>
+          <p:cNvSpPr txBox="1"/>
+          <p:nvPr/>
+        </p:nvSpPr>
+        <p:spPr>
+          <a:xfrm>
+            <a:off x="0" y="3505200"/>
+            <a:ext cx="914400" cy="461665"/>
+          </a:xfrm>
+          <a:prstGeom prst="rect">
+            <a:avLst/>
+          </a:prstGeom>
+          <a:noFill/>
+        </p:spPr>
+        <p:txBody>
+          <a:bodyPr wrap="square" rtlCol="0">
+            <a:spAutoFit/>
+          </a:bodyPr>
+          <a:lstStyle/>
+          <a:p>
+            <a:pPr algn="ctr"/>
+            <a:r>
+              <a:rPr kumimoji="1" lang="en-US" sz="1200" dirty="0" smtClean="0"/>
+              <a:t>Interpolate</a:t>
+            </a:r>
+          </a:p>
+          <a:p>
+            <a:pPr algn="ctr"/>
+            <a:r>
+              <a:rPr lang="en-US" sz="1200" dirty="0" smtClean="0"/>
+              <a:t>RGB</a:t>
+            </a:r>
+            <a:endParaRPr kumimoji="1" lang="en-US" sz="1200" dirty="0"/>
+          </a:p>
+        </p:txBody>
+      </p:sp>
+      <p:sp>
+        <p:nvSpPr>
+          <p:cNvPr id="6" name="Right Arrow 5"/>
+          <p:cNvSpPr/>
+          <p:nvPr/>
+        </p:nvSpPr>
+        <p:spPr>
+          <a:xfrm>
+            <a:off x="152400" y="1595735"/>
+            <a:ext cx="609600" cy="533400"/>
+          </a:xfrm>
+          <a:prstGeom prst="rightArrow">
+            <a:avLst/>
+          </a:prstGeom>
+        </p:spPr>
+        <p:style>
+          <a:lnRef idx="2">
+            <a:schemeClr val="accent1">
+              <a:shade val="50000"/>
+            </a:schemeClr>
+          </a:lnRef>
+          <a:fillRef idx="1">
+            <a:schemeClr val="accent1"/>
+          </a:fillRef>
+          <a:effectRef idx="0">
+            <a:schemeClr val="accent1"/>
+          </a:effectRef>
+          <a:fontRef idx="minor">
+            <a:schemeClr val="lt1"/>
+          </a:fontRef>
+        </p:style>
+        <p:txBody>
+          <a:bodyPr rtlCol="0" anchor="ctr"/>
+          <a:lstStyle/>
+          <a:p>
+            <a:pPr algn="ctr"/>
+            <a:endParaRPr kumimoji="1" lang="en-US"/>
+          </a:p>
+        </p:txBody>
+      </p:sp>
+      <p:sp>
+        <p:nvSpPr>
+          <p:cNvPr id="7" name="TextBox 6"/>
+          <p:cNvSpPr txBox="1"/>
+          <p:nvPr/>
+        </p:nvSpPr>
+        <p:spPr>
+          <a:xfrm>
+            <a:off x="0" y="2052935"/>
+            <a:ext cx="914400" cy="461665"/>
+          </a:xfrm>
+          <a:prstGeom prst="rect">
+            <a:avLst/>
+          </a:prstGeom>
+          <a:noFill/>
+        </p:spPr>
+        <p:txBody>
+          <a:bodyPr wrap="square" rtlCol="0">
+            <a:spAutoFit/>
+          </a:bodyPr>
+          <a:lstStyle/>
+          <a:p>
+            <a:pPr algn="ctr"/>
+            <a:r>
+              <a:rPr kumimoji="1" lang="en-US" sz="1200" dirty="0" smtClean="0"/>
+              <a:t>Interpolate</a:t>
+            </a:r>
+          </a:p>
+          <a:p>
+            <a:pPr algn="ctr"/>
+            <a:r>
+              <a:rPr lang="en-US" sz="1200" dirty="0" smtClean="0"/>
+              <a:t>UV</a:t>
+            </a:r>
+            <a:endParaRPr kumimoji="1" lang="en-US" sz="1200" dirty="0"/>
+          </a:p>
+        </p:txBody>
+      </p:sp>
+      <p:sp>
+        <p:nvSpPr>
+          <p:cNvPr id="8" name="Rounded Rectangle 7"/>
+          <p:cNvSpPr/>
+          <p:nvPr/>
+        </p:nvSpPr>
+        <p:spPr>
+          <a:xfrm>
+            <a:off x="838200" y="1443335"/>
+            <a:ext cx="381000" cy="914400"/>
+          </a:xfrm>
+          <a:prstGeom prst="roundRect">
+            <a:avLst/>
+          </a:prstGeom>
+        </p:spPr>
+        <p:style>
+          <a:lnRef idx="2">
+            <a:schemeClr val="accent1">
+              <a:shade val="50000"/>
+            </a:schemeClr>
+          </a:lnRef>
+          <a:fillRef idx="1">
+            <a:schemeClr val="accent1"/>
+          </a:fillRef>
+          <a:effectRef idx="0">
+            <a:schemeClr val="accent1"/>
+          </a:effectRef>
+          <a:fontRef idx="minor">
+            <a:schemeClr val="lt1"/>
+          </a:fontRef>
+        </p:style>
+        <p:txBody>
+          <a:bodyPr rtlCol="0" anchor="ctr"/>
+          <a:lstStyle/>
+          <a:p>
+            <a:pPr algn="ctr"/>
+            <a:endParaRPr kumimoji="1" lang="en-US"/>
+          </a:p>
+        </p:txBody>
+      </p:sp>
+      <p:sp>
+        <p:nvSpPr>
+          <p:cNvPr id="9" name="Right Arrow 8"/>
+          <p:cNvSpPr/>
+          <p:nvPr/>
+        </p:nvSpPr>
+        <p:spPr>
+          <a:xfrm>
+            <a:off x="1295400" y="1447800"/>
+            <a:ext cx="609600" cy="533400"/>
+          </a:xfrm>
+          <a:prstGeom prst="rightArrow">
+            <a:avLst/>
+          </a:prstGeom>
+        </p:spPr>
+        <p:style>
+          <a:lnRef idx="2">
+            <a:schemeClr val="accent1">
+              <a:shade val="50000"/>
+            </a:schemeClr>
+          </a:lnRef>
+          <a:fillRef idx="1">
+            <a:schemeClr val="accent1"/>
+          </a:fillRef>
+          <a:effectRef idx="0">
+            <a:schemeClr val="accent1"/>
+          </a:effectRef>
+          <a:fontRef idx="minor">
+            <a:schemeClr val="lt1"/>
+          </a:fontRef>
+        </p:style>
+        <p:txBody>
+          <a:bodyPr rtlCol="0" anchor="ctr"/>
+          <a:lstStyle/>
+          <a:p>
+            <a:pPr algn="ctr"/>
+            <a:endParaRPr kumimoji="1" lang="en-US"/>
+          </a:p>
+        </p:txBody>
+      </p:sp>
+      <p:sp>
+        <p:nvSpPr>
+          <p:cNvPr id="10" name="Rounded Rectangle 9"/>
+          <p:cNvSpPr/>
+          <p:nvPr/>
+        </p:nvSpPr>
+        <p:spPr>
+          <a:xfrm>
+            <a:off x="1066800" y="2667000"/>
+            <a:ext cx="914400" cy="381000"/>
+          </a:xfrm>
+          <a:prstGeom prst="roundRect">
+            <a:avLst/>
+          </a:prstGeom>
+        </p:spPr>
+        <p:style>
+          <a:lnRef idx="2">
+            <a:schemeClr val="accent6">
+              <a:shade val="50000"/>
+            </a:schemeClr>
+          </a:lnRef>
+          <a:fillRef idx="1">
+            <a:schemeClr val="accent6"/>
+          </a:fillRef>
+          <a:effectRef idx="0">
+            <a:schemeClr val="accent6"/>
+          </a:effectRef>
+          <a:fontRef idx="minor">
+            <a:schemeClr val="lt1"/>
+          </a:fontRef>
+        </p:style>
+        <p:txBody>
+          <a:bodyPr rtlCol="0" anchor="ctr"/>
+          <a:lstStyle/>
+          <a:p>
+            <a:pPr algn="ctr"/>
+            <a:r>
+              <a:rPr kumimoji="1" lang="en-US" sz="900" dirty="0" smtClean="0"/>
+              <a:t>Tex Window</a:t>
+            </a:r>
+          </a:p>
+          <a:p>
+            <a:pPr algn="ctr"/>
+            <a:r>
+              <a:rPr lang="en-US" sz="900" dirty="0" err="1" smtClean="0"/>
+              <a:t>Reg</a:t>
+            </a:r>
+            <a:endParaRPr kumimoji="1" lang="en-US" sz="900" dirty="0"/>
+          </a:p>
+        </p:txBody>
+      </p:sp>
+      <p:sp>
+        <p:nvSpPr>
+          <p:cNvPr id="11" name="Rounded Rectangle 10"/>
+          <p:cNvSpPr/>
+          <p:nvPr/>
+        </p:nvSpPr>
+        <p:spPr>
+          <a:xfrm>
+            <a:off x="1066800" y="2057400"/>
+            <a:ext cx="914400" cy="609600"/>
+          </a:xfrm>
+          <a:prstGeom prst="roundRect">
+            <a:avLst/>
+          </a:prstGeom>
+        </p:spPr>
+        <p:style>
+          <a:lnRef idx="2">
+            <a:schemeClr val="accent6">
+              <a:shade val="50000"/>
+            </a:schemeClr>
+          </a:lnRef>
+          <a:fillRef idx="1">
+            <a:schemeClr val="accent6"/>
+          </a:fillRef>
+          <a:effectRef idx="0">
+            <a:schemeClr val="accent6"/>
+          </a:effectRef>
+          <a:fontRef idx="minor">
+            <a:schemeClr val="lt1"/>
+          </a:fontRef>
+        </p:style>
+        <p:txBody>
+          <a:bodyPr rtlCol="0" anchor="ctr"/>
+          <a:lstStyle/>
+          <a:p>
+            <a:pPr algn="ctr"/>
+            <a:r>
+              <a:rPr kumimoji="1" lang="en-US" sz="900" dirty="0" smtClean="0"/>
+              <a:t>Tex Base X/Y</a:t>
+            </a:r>
+            <a:br>
+              <a:rPr kumimoji="1" lang="en-US" sz="900" dirty="0" smtClean="0"/>
+            </a:br>
+            <a:r>
+              <a:rPr kumimoji="1" lang="en-US" sz="900" dirty="0" smtClean="0"/>
+              <a:t>Tex Format</a:t>
+            </a:r>
+            <a:br>
+              <a:rPr kumimoji="1" lang="en-US" sz="900" dirty="0" smtClean="0"/>
+            </a:br>
+            <a:r>
+              <a:rPr kumimoji="1" lang="en-US" sz="900" dirty="0" smtClean="0"/>
+              <a:t>Tex Disable</a:t>
+            </a:r>
+            <a:br>
+              <a:rPr kumimoji="1" lang="en-US" sz="900" dirty="0" smtClean="0"/>
+            </a:br>
+            <a:r>
+              <a:rPr kumimoji="1" lang="en-US" sz="900" dirty="0" smtClean="0"/>
+              <a:t>Tex X/Y Flip</a:t>
+            </a:r>
+            <a:endParaRPr kumimoji="1" lang="en-US" sz="900" dirty="0"/>
+          </a:p>
+        </p:txBody>
+      </p:sp>
+      <p:cxnSp>
+        <p:nvCxnSpPr>
+          <p:cNvPr id="13" name="Straight Arrow Connector 12"/>
+          <p:cNvCxnSpPr/>
+          <p:nvPr/>
+        </p:nvCxnSpPr>
+        <p:spPr>
+          <a:xfrm>
+            <a:off x="152400" y="4690646"/>
+            <a:ext cx="1752600" cy="0"/>
+          </a:xfrm>
+          <a:prstGeom prst="straightConnector1">
+            <a:avLst/>
+          </a:prstGeom>
+          <a:ln>
+            <a:tailEnd type="arrow"/>
+          </a:ln>
+        </p:spPr>
+        <p:style>
+          <a:lnRef idx="1">
+            <a:schemeClr val="accent1"/>
+          </a:lnRef>
+          <a:fillRef idx="0">
+            <a:schemeClr val="accent1"/>
+          </a:fillRef>
+          <a:effectRef idx="0">
+            <a:schemeClr val="accent1"/>
+          </a:effectRef>
+          <a:fontRef idx="minor">
+            <a:schemeClr val="tx1"/>
+          </a:fontRef>
+        </p:style>
+      </p:cxnSp>
+      <p:sp>
+        <p:nvSpPr>
+          <p:cNvPr id="14" name="TextBox 13"/>
+          <p:cNvSpPr txBox="1"/>
+          <p:nvPr/>
+        </p:nvSpPr>
+        <p:spPr>
+          <a:xfrm>
+            <a:off x="69526" y="4502090"/>
+            <a:ext cx="769763" cy="261610"/>
+          </a:xfrm>
+          <a:prstGeom prst="rect">
+            <a:avLst/>
+          </a:prstGeom>
+          <a:noFill/>
+        </p:spPr>
+        <p:txBody>
+          <a:bodyPr wrap="none" rtlCol="0">
+            <a:spAutoFit/>
+          </a:bodyPr>
+          <a:lstStyle/>
+          <a:p>
+            <a:r>
+              <a:rPr kumimoji="1" lang="en-US" sz="1100" dirty="0" smtClean="0"/>
+              <a:t>Valid Pixel</a:t>
+            </a:r>
+            <a:endParaRPr kumimoji="1" lang="en-US" sz="1100" dirty="0"/>
+          </a:p>
+        </p:txBody>
+      </p:sp>
+      <p:sp>
+        <p:nvSpPr>
+          <p:cNvPr id="15" name="TextBox 14"/>
+          <p:cNvSpPr txBox="1"/>
+          <p:nvPr/>
+        </p:nvSpPr>
+        <p:spPr>
+          <a:xfrm>
+            <a:off x="152400" y="4690646"/>
+            <a:ext cx="1638590" cy="338554"/>
+          </a:xfrm>
+          <a:prstGeom prst="rect">
+            <a:avLst/>
+          </a:prstGeom>
+          <a:noFill/>
+        </p:spPr>
+        <p:txBody>
+          <a:bodyPr wrap="none" rtlCol="0">
+            <a:spAutoFit/>
+          </a:bodyPr>
+          <a:lstStyle/>
+          <a:p>
+            <a:r>
+              <a:rPr kumimoji="1" lang="en-US" sz="800" dirty="0" smtClean="0"/>
+              <a:t>Inside Primitive</a:t>
+            </a:r>
+          </a:p>
+          <a:p>
+            <a:r>
+              <a:rPr lang="en-US" sz="800" dirty="0" smtClean="0"/>
+              <a:t>&amp; Stencil OK (no stencil or mask=1)</a:t>
+            </a:r>
+            <a:endParaRPr kumimoji="1" lang="en-US" sz="800" dirty="0"/>
+          </a:p>
+        </p:txBody>
+      </p:sp>
+      <p:cxnSp>
+        <p:nvCxnSpPr>
+          <p:cNvPr id="16" name="Straight Arrow Connector 15"/>
+          <p:cNvCxnSpPr/>
+          <p:nvPr/>
+        </p:nvCxnSpPr>
+        <p:spPr>
+          <a:xfrm>
+            <a:off x="152400" y="5224046"/>
+            <a:ext cx="1752600" cy="0"/>
+          </a:xfrm>
+          <a:prstGeom prst="straightConnector1">
+            <a:avLst/>
+          </a:prstGeom>
+          <a:ln>
+            <a:headEnd type="arrow" w="med" len="med"/>
+            <a:tailEnd type="none" w="med" len="med"/>
+          </a:ln>
+        </p:spPr>
+        <p:style>
+          <a:lnRef idx="1">
+            <a:schemeClr val="accent1"/>
+          </a:lnRef>
+          <a:fillRef idx="0">
+            <a:schemeClr val="accent1"/>
+          </a:fillRef>
+          <a:effectRef idx="0">
+            <a:schemeClr val="accent1"/>
+          </a:effectRef>
+          <a:fontRef idx="minor">
+            <a:schemeClr val="tx1"/>
+          </a:fontRef>
+        </p:style>
+      </p:cxnSp>
+      <p:sp>
+        <p:nvSpPr>
+          <p:cNvPr id="17" name="TextBox 16"/>
+          <p:cNvSpPr txBox="1"/>
+          <p:nvPr/>
+        </p:nvSpPr>
+        <p:spPr>
+          <a:xfrm>
+            <a:off x="69526" y="5035490"/>
+            <a:ext cx="453970" cy="261610"/>
+          </a:xfrm>
+          <a:prstGeom prst="rect">
+            <a:avLst/>
+          </a:prstGeom>
+          <a:noFill/>
+        </p:spPr>
+        <p:txBody>
+          <a:bodyPr wrap="none" rtlCol="0">
+            <a:spAutoFit/>
+          </a:bodyPr>
+          <a:lstStyle/>
+          <a:p>
+            <a:r>
+              <a:rPr lang="en-US" sz="1100" dirty="0" smtClean="0"/>
+              <a:t>Next</a:t>
+            </a:r>
+            <a:endParaRPr kumimoji="1" lang="en-US" sz="1100" dirty="0"/>
+          </a:p>
+        </p:txBody>
+      </p:sp>
+      <p:sp>
+        <p:nvSpPr>
+          <p:cNvPr id="18" name="TextBox 17"/>
+          <p:cNvSpPr txBox="1"/>
+          <p:nvPr/>
+        </p:nvSpPr>
+        <p:spPr>
+          <a:xfrm>
+            <a:off x="228600" y="5224046"/>
+            <a:ext cx="1981633" cy="338554"/>
+          </a:xfrm>
+          <a:prstGeom prst="rect">
+            <a:avLst/>
+          </a:prstGeom>
+          <a:noFill/>
+        </p:spPr>
+        <p:txBody>
+          <a:bodyPr wrap="none" rtlCol="0">
+            <a:spAutoFit/>
+          </a:bodyPr>
+          <a:lstStyle/>
+          <a:p>
+            <a:r>
+              <a:rPr kumimoji="1" lang="en-US" sz="800" dirty="0" smtClean="0"/>
+              <a:t>Needed to WAIT for CLUT</a:t>
+            </a:r>
+          </a:p>
+          <a:p>
+            <a:r>
+              <a:rPr lang="en-US" sz="800" dirty="0" smtClean="0"/>
+              <a:t>or TEX CACHE or other (FIFO ? </a:t>
+            </a:r>
+            <a:r>
+              <a:rPr lang="en-US" sz="800" dirty="0" err="1" smtClean="0"/>
+              <a:t>WriteBack</a:t>
+            </a:r>
+            <a:r>
+              <a:rPr lang="en-US" sz="800" dirty="0" smtClean="0"/>
+              <a:t> ?)</a:t>
+            </a:r>
+            <a:endParaRPr kumimoji="1" lang="en-US" sz="800" dirty="0"/>
+          </a:p>
+        </p:txBody>
+      </p:sp>
+      <p:sp>
+        <p:nvSpPr>
+          <p:cNvPr id="19" name="Rectangle 18"/>
+          <p:cNvSpPr/>
+          <p:nvPr/>
+        </p:nvSpPr>
+        <p:spPr>
+          <a:xfrm>
+            <a:off x="2057400" y="1447800"/>
+            <a:ext cx="228600" cy="2895600"/>
+          </a:xfrm>
+          <a:prstGeom prst="rect">
+            <a:avLst/>
+          </a:prstGeom>
+        </p:spPr>
+        <p:style>
+          <a:lnRef idx="2">
+            <a:schemeClr val="accent3">
+              <a:shade val="50000"/>
+            </a:schemeClr>
+          </a:lnRef>
+          <a:fillRef idx="1">
+            <a:schemeClr val="accent3"/>
+          </a:fillRef>
+          <a:effectRef idx="0">
+            <a:schemeClr val="accent3"/>
+          </a:effectRef>
+          <a:fontRef idx="minor">
+            <a:schemeClr val="lt1"/>
+          </a:fontRef>
+        </p:style>
+        <p:txBody>
+          <a:bodyPr rtlCol="0" anchor="ctr"/>
+          <a:lstStyle/>
+          <a:p>
+            <a:pPr algn="ctr"/>
+            <a:endParaRPr kumimoji="1" lang="en-US"/>
+          </a:p>
+        </p:txBody>
+      </p:sp>
+      <p:sp>
+        <p:nvSpPr>
+          <p:cNvPr id="20" name="Rectangle 19"/>
+          <p:cNvSpPr/>
+          <p:nvPr/>
+        </p:nvSpPr>
+        <p:spPr>
+          <a:xfrm>
+            <a:off x="1524000" y="990600"/>
+            <a:ext cx="1371600" cy="457200"/>
+          </a:xfrm>
+          <a:prstGeom prst="rect">
+            <a:avLst/>
+          </a:prstGeom>
+        </p:spPr>
+        <p:style>
+          <a:lnRef idx="2">
+            <a:schemeClr val="accent5">
+              <a:shade val="50000"/>
+            </a:schemeClr>
+          </a:lnRef>
+          <a:fillRef idx="1">
+            <a:schemeClr val="accent5"/>
+          </a:fillRef>
+          <a:effectRef idx="0">
+            <a:schemeClr val="accent5"/>
+          </a:effectRef>
+          <a:fontRef idx="minor">
+            <a:schemeClr val="lt1"/>
+          </a:fontRef>
+        </p:style>
+        <p:txBody>
+          <a:bodyPr rtlCol="0" anchor="ctr"/>
+          <a:lstStyle/>
+          <a:p>
+            <a:pPr algn="ctr"/>
+            <a:r>
+              <a:rPr kumimoji="1" lang="en-US" dirty="0" smtClean="0"/>
+              <a:t>TEX$</a:t>
+            </a:r>
+            <a:endParaRPr kumimoji="1" lang="en-US" dirty="0"/>
+          </a:p>
+        </p:txBody>
+      </p:sp>
+      <p:cxnSp>
+        <p:nvCxnSpPr>
+          <p:cNvPr id="23" name="Straight Arrow Connector 22"/>
+          <p:cNvCxnSpPr/>
+          <p:nvPr/>
+        </p:nvCxnSpPr>
+        <p:spPr>
+          <a:xfrm>
+            <a:off x="152400" y="4419600"/>
+            <a:ext cx="1752600" cy="0"/>
+          </a:xfrm>
+          <a:prstGeom prst="straightConnector1">
+            <a:avLst/>
+          </a:prstGeom>
+          <a:ln>
+            <a:tailEnd type="arrow"/>
+          </a:ln>
+        </p:spPr>
+        <p:style>
+          <a:lnRef idx="1">
+            <a:schemeClr val="accent1"/>
+          </a:lnRef>
+          <a:fillRef idx="0">
+            <a:schemeClr val="accent1"/>
+          </a:fillRef>
+          <a:effectRef idx="0">
+            <a:schemeClr val="accent1"/>
+          </a:effectRef>
+          <a:fontRef idx="minor">
+            <a:schemeClr val="tx1"/>
+          </a:fontRef>
+        </p:style>
+      </p:cxnSp>
+      <p:sp>
+        <p:nvSpPr>
+          <p:cNvPr id="24" name="TextBox 23"/>
+          <p:cNvSpPr txBox="1"/>
+          <p:nvPr/>
+        </p:nvSpPr>
+        <p:spPr>
+          <a:xfrm>
+            <a:off x="69526" y="4231044"/>
+            <a:ext cx="1561646" cy="261610"/>
+          </a:xfrm>
+          <a:prstGeom prst="rect">
+            <a:avLst/>
+          </a:prstGeom>
+          <a:noFill/>
+        </p:spPr>
+        <p:txBody>
+          <a:bodyPr wrap="none" rtlCol="0">
+            <a:spAutoFit/>
+          </a:bodyPr>
+          <a:lstStyle/>
+          <a:p>
+            <a:r>
+              <a:rPr kumimoji="1" lang="en-US" sz="1100" dirty="0" smtClean="0"/>
+              <a:t>X[1:0] / Y[1:0] for dither</a:t>
+            </a:r>
+            <a:endParaRPr kumimoji="1" lang="en-US" sz="1100" dirty="0"/>
+          </a:p>
+        </p:txBody>
+      </p:sp>
+      <p:sp>
+        <p:nvSpPr>
+          <p:cNvPr id="25" name="Rectangle 24"/>
+          <p:cNvSpPr/>
+          <p:nvPr/>
+        </p:nvSpPr>
+        <p:spPr>
+          <a:xfrm>
+            <a:off x="3810000" y="990600"/>
+            <a:ext cx="1371600" cy="457200"/>
+          </a:xfrm>
+          <a:prstGeom prst="rect">
+            <a:avLst/>
+          </a:prstGeom>
+        </p:spPr>
+        <p:style>
+          <a:lnRef idx="2">
+            <a:schemeClr val="accent5">
+              <a:shade val="50000"/>
+            </a:schemeClr>
+          </a:lnRef>
+          <a:fillRef idx="1">
+            <a:schemeClr val="accent5"/>
+          </a:fillRef>
+          <a:effectRef idx="0">
+            <a:schemeClr val="accent5"/>
+          </a:effectRef>
+          <a:fontRef idx="minor">
+            <a:schemeClr val="lt1"/>
+          </a:fontRef>
+        </p:style>
+        <p:txBody>
+          <a:bodyPr rtlCol="0" anchor="ctr"/>
+          <a:lstStyle/>
+          <a:p>
+            <a:pPr algn="ctr"/>
+            <a:r>
+              <a:rPr kumimoji="1" lang="en-US" dirty="0" smtClean="0"/>
+              <a:t>CLUT$</a:t>
+            </a:r>
+            <a:endParaRPr kumimoji="1" lang="en-US" dirty="0"/>
+          </a:p>
+        </p:txBody>
+      </p:sp>
+      <p:sp>
+        <p:nvSpPr>
+          <p:cNvPr id="26" name="Rectangle 25"/>
+          <p:cNvSpPr/>
+          <p:nvPr/>
+        </p:nvSpPr>
+        <p:spPr>
+          <a:xfrm>
+            <a:off x="4419600" y="1447800"/>
+            <a:ext cx="228600" cy="1447800"/>
+          </a:xfrm>
+          <a:prstGeom prst="rect">
+            <a:avLst/>
+          </a:prstGeom>
+        </p:spPr>
+        <p:style>
+          <a:lnRef idx="2">
+            <a:schemeClr val="accent3">
+              <a:shade val="50000"/>
+            </a:schemeClr>
+          </a:lnRef>
+          <a:fillRef idx="1">
+            <a:schemeClr val="accent3"/>
+          </a:fillRef>
+          <a:effectRef idx="0">
+            <a:schemeClr val="accent3"/>
+          </a:effectRef>
+          <a:fontRef idx="minor">
+            <a:schemeClr val="lt1"/>
+          </a:fontRef>
+        </p:style>
+        <p:txBody>
+          <a:bodyPr rtlCol="0" anchor="ctr"/>
+          <a:lstStyle/>
+          <a:p>
+            <a:pPr algn="ctr"/>
+            <a:endParaRPr kumimoji="1" lang="en-US"/>
+          </a:p>
+        </p:txBody>
+      </p:sp>
+      <p:sp>
+        <p:nvSpPr>
+          <p:cNvPr id="27" name="Rectangle 26"/>
+          <p:cNvSpPr/>
+          <p:nvPr/>
+        </p:nvSpPr>
+        <p:spPr>
+          <a:xfrm>
+            <a:off x="4419600" y="3048000"/>
+            <a:ext cx="228600" cy="1295400"/>
+          </a:xfrm>
+          <a:prstGeom prst="rect">
+            <a:avLst/>
+          </a:prstGeom>
+        </p:spPr>
+        <p:style>
+          <a:lnRef idx="2">
+            <a:schemeClr val="accent3">
+              <a:shade val="50000"/>
+            </a:schemeClr>
+          </a:lnRef>
+          <a:fillRef idx="1">
+            <a:schemeClr val="accent3"/>
+          </a:fillRef>
+          <a:effectRef idx="0">
+            <a:schemeClr val="accent3"/>
+          </a:effectRef>
+          <a:fontRef idx="minor">
+            <a:schemeClr val="lt1"/>
+          </a:fontRef>
+        </p:style>
+        <p:txBody>
+          <a:bodyPr rtlCol="0" anchor="ctr"/>
+          <a:lstStyle/>
+          <a:p>
+            <a:pPr algn="ctr"/>
+            <a:endParaRPr kumimoji="1" lang="en-US"/>
+          </a:p>
+        </p:txBody>
+      </p:sp>
+      <p:sp>
+        <p:nvSpPr>
+          <p:cNvPr id="28" name="TextBox 27"/>
+          <p:cNvSpPr txBox="1"/>
+          <p:nvPr/>
+        </p:nvSpPr>
+        <p:spPr>
+          <a:xfrm>
+            <a:off x="4191000" y="4343400"/>
+            <a:ext cx="811441" cy="400110"/>
+          </a:xfrm>
+          <a:prstGeom prst="rect">
+            <a:avLst/>
+          </a:prstGeom>
+          <a:noFill/>
+        </p:spPr>
+        <p:txBody>
+          <a:bodyPr wrap="none" rtlCol="0">
+            <a:spAutoFit/>
+          </a:bodyPr>
+          <a:lstStyle/>
+          <a:p>
+            <a:r>
+              <a:rPr kumimoji="1" lang="en-US" sz="1000" dirty="0" smtClean="0"/>
+              <a:t>Pipe if TRUE</a:t>
+            </a:r>
+          </a:p>
+          <a:p>
+            <a:r>
+              <a:rPr lang="en-US" sz="1000" dirty="0" smtClean="0"/>
+              <a:t>COLOR</a:t>
+            </a:r>
+            <a:endParaRPr kumimoji="1" lang="en-US" sz="1000" dirty="0"/>
+          </a:p>
+        </p:txBody>
+      </p:sp>
+      <p:sp>
+        <p:nvSpPr>
+          <p:cNvPr id="29" name="TextBox 28"/>
+          <p:cNvSpPr txBox="1"/>
+          <p:nvPr/>
+        </p:nvSpPr>
+        <p:spPr>
+          <a:xfrm>
+            <a:off x="152400" y="5638800"/>
+            <a:ext cx="3418372" cy="738664"/>
+          </a:xfrm>
+          <a:prstGeom prst="rect">
+            <a:avLst/>
+          </a:prstGeom>
+          <a:noFill/>
+        </p:spPr>
+        <p:txBody>
+          <a:bodyPr wrap="none" rtlCol="0">
+            <a:spAutoFit/>
+          </a:bodyPr>
+          <a:lstStyle/>
+          <a:p>
+            <a:r>
+              <a:rPr kumimoji="1" lang="en-US" sz="1400" i="1" dirty="0" smtClean="0"/>
+              <a:t>Next = </a:t>
+            </a:r>
+            <a:r>
+              <a:rPr kumimoji="1" lang="en-US" sz="1400" i="1" dirty="0" err="1" smtClean="0"/>
+              <a:t>Tex$Hit</a:t>
+            </a:r>
+            <a:r>
+              <a:rPr kumimoji="1" lang="en-US" sz="1400" i="1" dirty="0" smtClean="0"/>
+              <a:t> &amp; </a:t>
+            </a:r>
+            <a:r>
+              <a:rPr kumimoji="1" lang="en-US" sz="1400" i="1" dirty="0" err="1" smtClean="0"/>
+              <a:t>Clut$Hit</a:t>
+            </a:r>
+            <a:endParaRPr kumimoji="1" lang="en-US" sz="1400" i="1" dirty="0" smtClean="0"/>
+          </a:p>
+          <a:p>
+            <a:r>
+              <a:rPr lang="en-US" sz="1400" i="1" dirty="0" err="1" smtClean="0"/>
+              <a:t>Tex$Hit</a:t>
+            </a:r>
+            <a:r>
+              <a:rPr lang="en-US" sz="1400" i="1" dirty="0" smtClean="0"/>
+              <a:t> = Real Hit | </a:t>
+            </a:r>
+            <a:r>
+              <a:rPr lang="en-US" sz="1400" i="1" dirty="0" err="1" smtClean="0"/>
+              <a:t>TexDisable</a:t>
+            </a:r>
+            <a:r>
+              <a:rPr lang="en-US" sz="1400" i="1" dirty="0" smtClean="0"/>
+              <a:t> | Invalid Pixel</a:t>
+            </a:r>
+          </a:p>
+          <a:p>
+            <a:r>
+              <a:rPr kumimoji="1" lang="en-US" sz="1400" i="1" dirty="0" err="1" smtClean="0"/>
+              <a:t>Clut$Hit</a:t>
+            </a:r>
+            <a:r>
+              <a:rPr kumimoji="1" lang="en-US" sz="1400" i="1" dirty="0" smtClean="0"/>
+              <a:t> = Real Hit | </a:t>
+            </a:r>
+            <a:r>
+              <a:rPr kumimoji="1" lang="en-US" sz="1400" i="1" dirty="0" err="1" smtClean="0"/>
+              <a:t>TrueColor</a:t>
+            </a:r>
+            <a:r>
+              <a:rPr kumimoji="1" lang="en-US" sz="1400" i="1" dirty="0" smtClean="0"/>
+              <a:t> | Invalid Pixel</a:t>
+            </a:r>
+            <a:endParaRPr kumimoji="1" lang="en-US" sz="1400" i="1" dirty="0"/>
+          </a:p>
+        </p:txBody>
+      </p:sp>
+      <p:sp>
+        <p:nvSpPr>
+          <p:cNvPr id="30" name="TextBox 29"/>
+          <p:cNvSpPr txBox="1"/>
+          <p:nvPr/>
+        </p:nvSpPr>
+        <p:spPr>
+          <a:xfrm>
+            <a:off x="4343400" y="5334000"/>
+            <a:ext cx="5003614" cy="1477328"/>
+          </a:xfrm>
+          <a:prstGeom prst="rect">
+            <a:avLst/>
+          </a:prstGeom>
+          <a:noFill/>
+        </p:spPr>
+        <p:txBody>
+          <a:bodyPr wrap="none" rtlCol="0">
+            <a:spAutoFit/>
+          </a:bodyPr>
+          <a:lstStyle/>
+          <a:p>
+            <a:r>
+              <a:rPr kumimoji="1" lang="en-US" dirty="0" smtClean="0"/>
+              <a:t>1/ If Tex out not found, UV and RGB won’t change</a:t>
+            </a:r>
+          </a:p>
+          <a:p>
+            <a:r>
+              <a:rPr lang="en-US" dirty="0" smtClean="0"/>
+              <a:t>-&gt; Force to read Tex$ until data updated.</a:t>
+            </a:r>
+          </a:p>
+          <a:p>
+            <a:r>
+              <a:rPr kumimoji="1" lang="en-US" dirty="0" smtClean="0"/>
+              <a:t>2/ On Tex$ </a:t>
+            </a:r>
+            <a:r>
+              <a:rPr kumimoji="1" lang="en-US" dirty="0" err="1" smtClean="0"/>
+              <a:t>Hit</a:t>
+            </a:r>
+            <a:r>
+              <a:rPr kumimoji="1" lang="en-US" dirty="0" err="1" smtClean="0">
+                <a:sym typeface="Wingdings" pitchFamily="2" charset="2"/>
+              </a:rPr>
+              <a:t>Miss</a:t>
+            </a:r>
+            <a:r>
+              <a:rPr kumimoji="1" lang="en-US" dirty="0" smtClean="0">
+                <a:sym typeface="Wingdings" pitchFamily="2" charset="2"/>
+              </a:rPr>
+              <a:t> Transition for both valid pixel.</a:t>
+            </a:r>
+          </a:p>
+          <a:p>
+            <a:r>
+              <a:rPr lang="en-US" dirty="0" smtClean="0">
+                <a:sym typeface="Wingdings" pitchFamily="2" charset="2"/>
+              </a:rPr>
+              <a:t>We kick a TEX$ cache update read.</a:t>
+            </a:r>
+          </a:p>
+          <a:p>
+            <a:r>
+              <a:rPr kumimoji="1" lang="en-US" dirty="0" smtClean="0">
+                <a:sym typeface="Wingdings" pitchFamily="2" charset="2"/>
+              </a:rPr>
+              <a:t>Same with </a:t>
+            </a:r>
+            <a:r>
+              <a:rPr kumimoji="1" lang="en-US" dirty="0" err="1" smtClean="0">
+                <a:sym typeface="Wingdings" pitchFamily="2" charset="2"/>
+              </a:rPr>
+              <a:t>Clut</a:t>
+            </a:r>
+            <a:r>
+              <a:rPr kumimoji="1" lang="en-US" dirty="0" smtClean="0">
+                <a:sym typeface="Wingdings" pitchFamily="2" charset="2"/>
+              </a:rPr>
+              <a:t>$</a:t>
+            </a:r>
+            <a:endParaRPr kumimoji="1" lang="en-US" dirty="0"/>
           </a:p>
         </p:txBody>
       </p:sp>

</xml_diff>

<commit_message>
[GPU Modify]TEX$ now use 17 bit adr for cache update (8 byte block) and 19 bit for cache read (16 bit read). [GPU Fix]Changed TEX$ because it was not building properly instancing BRAM. [GPU Fix]Proper RGB signal size in pipeline control. Also texel adress on 19 bit for read. (not 20 bit). (Matching TEX$ spec) + Name refactoring. [GPU Clean]TEXUnit signal name changed. [GPU ADD] Played Mario the plumber : GPUPipeFullPipe.v is just plumbing all various units together. 400 lines of plumbing.
</commit_message>
<xml_diff>
--- a/hdlGPU/doc/PixelPipeline.pptx
+++ b/hdlGPU/doc/PixelPipeline.pptx
@@ -5,11 +5,12 @@
     <p:sldMasterId id="2147483648" r:id="rId1"/>
   </p:sldMasterIdLst>
   <p:notesMasterIdLst>
-    <p:notesMasterId r:id="rId4"/>
+    <p:notesMasterId r:id="rId5"/>
   </p:notesMasterIdLst>
   <p:sldIdLst>
     <p:sldId id="256" r:id="rId2"/>
     <p:sldId id="257" r:id="rId3"/>
+    <p:sldId id="258" r:id="rId4"/>
   </p:sldIdLst>
   <p:sldSz cx="9144000" cy="6858000" type="screen4x3"/>
   <p:notesSz cx="6858000" cy="9144000"/>
@@ -194,7 +195,7 @@
             <a:fld id="{C052AE38-D59F-48A8-9A0F-289367896B14}" type="datetimeFigureOut">
               <a:rPr kumimoji="1" lang="en-US" smtClean="0"/>
               <a:pPr/>
-              <a:t>10/1/2019</a:t>
+              <a:t>10/24/2019</a:t>
             </a:fld>
             <a:endParaRPr kumimoji="1" lang="en-US"/>
           </a:p>
@@ -629,6 +630,95 @@
 </p:notes>
 </file>
 
+<file path=ppt/notesSlides/notesSlide2.xml><?xml version="1.0" encoding="utf-8"?>
+<p:notes xmlns:a="http://schemas.openxmlformats.org/drawingml/2006/main" xmlns:r="http://schemas.openxmlformats.org/officeDocument/2006/relationships" xmlns:p="http://schemas.openxmlformats.org/presentationml/2006/main">
+  <p:cSld>
+    <p:spTree>
+      <p:nvGrpSpPr>
+        <p:cNvPr id="1" name=""/>
+        <p:cNvGrpSpPr/>
+        <p:nvPr/>
+      </p:nvGrpSpPr>
+      <p:grpSpPr>
+        <a:xfrm>
+          <a:off x="0" y="0"/>
+          <a:ext cx="0" cy="0"/>
+          <a:chOff x="0" y="0"/>
+          <a:chExt cx="0" cy="0"/>
+        </a:xfrm>
+      </p:grpSpPr>
+      <p:sp>
+        <p:nvSpPr>
+          <p:cNvPr id="2" name="Slide Image Placeholder 1"/>
+          <p:cNvSpPr>
+            <a:spLocks noGrp="1" noRot="1" noChangeAspect="1"/>
+          </p:cNvSpPr>
+          <p:nvPr>
+            <p:ph type="sldImg"/>
+          </p:nvPr>
+        </p:nvSpPr>
+        <p:spPr/>
+      </p:sp>
+      <p:sp>
+        <p:nvSpPr>
+          <p:cNvPr id="3" name="Notes Placeholder 2"/>
+          <p:cNvSpPr>
+            <a:spLocks noGrp="1"/>
+          </p:cNvSpPr>
+          <p:nvPr>
+            <p:ph type="body" idx="1"/>
+          </p:nvPr>
+        </p:nvSpPr>
+        <p:spPr/>
+        <p:txBody>
+          <a:bodyPr>
+            <a:normAutofit/>
+          </a:bodyPr>
+          <a:lstStyle/>
+          <a:p>
+            <a:r>
+              <a:rPr kumimoji="1" lang="en-US" dirty="0" smtClean="0"/>
+              <a:t>Note : SCISSOR (DRAW AREA), STENCIL (MASKING) can do EARLY TEST and generate</a:t>
+            </a:r>
+            <a:r>
+              <a:rPr kumimoji="1" lang="en-US" baseline="0" dirty="0" smtClean="0"/>
+              <a:t> single bit L&amp;R directly before this stage.</a:t>
+            </a:r>
+          </a:p>
+        </p:txBody>
+      </p:sp>
+      <p:sp>
+        <p:nvSpPr>
+          <p:cNvPr id="4" name="Slide Number Placeholder 3"/>
+          <p:cNvSpPr>
+            <a:spLocks noGrp="1"/>
+          </p:cNvSpPr>
+          <p:nvPr>
+            <p:ph type="sldNum" sz="quarter" idx="10"/>
+          </p:nvPr>
+        </p:nvSpPr>
+        <p:spPr/>
+        <p:txBody>
+          <a:bodyPr/>
+          <a:lstStyle/>
+          <a:p>
+            <a:fld id="{D815809D-C2FA-420E-85F2-766FEFD3741C}" type="slidenum">
+              <a:rPr kumimoji="1" lang="en-US" smtClean="0"/>
+              <a:pPr/>
+              <a:t>3</a:t>
+            </a:fld>
+            <a:endParaRPr kumimoji="1" lang="en-US"/>
+          </a:p>
+        </p:txBody>
+      </p:sp>
+    </p:spTree>
+  </p:cSld>
+  <p:clrMapOvr>
+    <a:masterClrMapping/>
+  </p:clrMapOvr>
+</p:notes>
+</file>
+
 <file path=ppt/slideLayouts/slideLayout1.xml><?xml version="1.0" encoding="utf-8"?>
 <p:sldLayout xmlns:a="http://schemas.openxmlformats.org/drawingml/2006/main" xmlns:r="http://schemas.openxmlformats.org/officeDocument/2006/relationships" xmlns:p="http://schemas.openxmlformats.org/presentationml/2006/main" type="title" preserve="1">
   <p:cSld name="Title Slide">
@@ -811,7 +901,7 @@
             <a:fld id="{443C613D-398D-48F4-958F-9A4A8112E92D}" type="datetimeFigureOut">
               <a:rPr kumimoji="1" lang="en-US" smtClean="0"/>
               <a:pPr/>
-              <a:t>10/1/2019</a:t>
+              <a:t>10/24/2019</a:t>
             </a:fld>
             <a:endParaRPr kumimoji="1" lang="en-US"/>
           </a:p>
@@ -978,7 +1068,7 @@
             <a:fld id="{443C613D-398D-48F4-958F-9A4A8112E92D}" type="datetimeFigureOut">
               <a:rPr kumimoji="1" lang="en-US" smtClean="0"/>
               <a:pPr/>
-              <a:t>10/1/2019</a:t>
+              <a:t>10/24/2019</a:t>
             </a:fld>
             <a:endParaRPr kumimoji="1" lang="en-US"/>
           </a:p>
@@ -1155,7 +1245,7 @@
             <a:fld id="{443C613D-398D-48F4-958F-9A4A8112E92D}" type="datetimeFigureOut">
               <a:rPr kumimoji="1" lang="en-US" smtClean="0"/>
               <a:pPr/>
-              <a:t>10/1/2019</a:t>
+              <a:t>10/24/2019</a:t>
             </a:fld>
             <a:endParaRPr kumimoji="1" lang="en-US"/>
           </a:p>
@@ -1322,7 +1412,7 @@
             <a:fld id="{443C613D-398D-48F4-958F-9A4A8112E92D}" type="datetimeFigureOut">
               <a:rPr kumimoji="1" lang="en-US" smtClean="0"/>
               <a:pPr/>
-              <a:t>10/1/2019</a:t>
+              <a:t>10/24/2019</a:t>
             </a:fld>
             <a:endParaRPr kumimoji="1" lang="en-US"/>
           </a:p>
@@ -1565,7 +1655,7 @@
             <a:fld id="{443C613D-398D-48F4-958F-9A4A8112E92D}" type="datetimeFigureOut">
               <a:rPr kumimoji="1" lang="en-US" smtClean="0"/>
               <a:pPr/>
-              <a:t>10/1/2019</a:t>
+              <a:t>10/24/2019</a:t>
             </a:fld>
             <a:endParaRPr kumimoji="1" lang="en-US"/>
           </a:p>
@@ -1850,7 +1940,7 @@
             <a:fld id="{443C613D-398D-48F4-958F-9A4A8112E92D}" type="datetimeFigureOut">
               <a:rPr kumimoji="1" lang="en-US" smtClean="0"/>
               <a:pPr/>
-              <a:t>10/1/2019</a:t>
+              <a:t>10/24/2019</a:t>
             </a:fld>
             <a:endParaRPr kumimoji="1" lang="en-US"/>
           </a:p>
@@ -2269,7 +2359,7 @@
             <a:fld id="{443C613D-398D-48F4-958F-9A4A8112E92D}" type="datetimeFigureOut">
               <a:rPr kumimoji="1" lang="en-US" smtClean="0"/>
               <a:pPr/>
-              <a:t>10/1/2019</a:t>
+              <a:t>10/24/2019</a:t>
             </a:fld>
             <a:endParaRPr kumimoji="1" lang="en-US"/>
           </a:p>
@@ -2384,7 +2474,7 @@
             <a:fld id="{443C613D-398D-48F4-958F-9A4A8112E92D}" type="datetimeFigureOut">
               <a:rPr kumimoji="1" lang="en-US" smtClean="0"/>
               <a:pPr/>
-              <a:t>10/1/2019</a:t>
+              <a:t>10/24/2019</a:t>
             </a:fld>
             <a:endParaRPr kumimoji="1" lang="en-US"/>
           </a:p>
@@ -2476,7 +2566,7 @@
             <a:fld id="{443C613D-398D-48F4-958F-9A4A8112E92D}" type="datetimeFigureOut">
               <a:rPr kumimoji="1" lang="en-US" smtClean="0"/>
               <a:pPr/>
-              <a:t>10/1/2019</a:t>
+              <a:t>10/24/2019</a:t>
             </a:fld>
             <a:endParaRPr kumimoji="1" lang="en-US"/>
           </a:p>
@@ -2750,7 +2840,7 @@
             <a:fld id="{443C613D-398D-48F4-958F-9A4A8112E92D}" type="datetimeFigureOut">
               <a:rPr kumimoji="1" lang="en-US" smtClean="0"/>
               <a:pPr/>
-              <a:t>10/1/2019</a:t>
+              <a:t>10/24/2019</a:t>
             </a:fld>
             <a:endParaRPr kumimoji="1" lang="en-US"/>
           </a:p>
@@ -3000,7 +3090,7 @@
             <a:fld id="{443C613D-398D-48F4-958F-9A4A8112E92D}" type="datetimeFigureOut">
               <a:rPr kumimoji="1" lang="en-US" smtClean="0"/>
               <a:pPr/>
-              <a:t>10/1/2019</a:t>
+              <a:t>10/24/2019</a:t>
             </a:fld>
             <a:endParaRPr kumimoji="1" lang="en-US"/>
           </a:p>
@@ -3210,7 +3300,7 @@
             <a:fld id="{443C613D-398D-48F4-958F-9A4A8112E92D}" type="datetimeFigureOut">
               <a:rPr kumimoji="1" lang="en-US" smtClean="0"/>
               <a:pPr/>
-              <a:t>10/1/2019</a:t>
+              <a:t>10/24/2019</a:t>
             </a:fld>
             <a:endParaRPr kumimoji="1" lang="en-US"/>
           </a:p>
@@ -7001,6 +7091,1341 @@
               <a:t>$</a:t>
             </a:r>
             <a:endParaRPr kumimoji="1" lang="en-US" dirty="0"/>
+          </a:p>
+        </p:txBody>
+      </p:sp>
+    </p:spTree>
+  </p:cSld>
+  <p:clrMapOvr>
+    <a:masterClrMapping/>
+  </p:clrMapOvr>
+</p:sld>
+</file>
+
+<file path=ppt/slides/slide3.xml><?xml version="1.0" encoding="utf-8"?>
+<p:sld xmlns:a="http://schemas.openxmlformats.org/drawingml/2006/main" xmlns:r="http://schemas.openxmlformats.org/officeDocument/2006/relationships" xmlns:p="http://schemas.openxmlformats.org/presentationml/2006/main">
+  <p:cSld>
+    <p:spTree>
+      <p:nvGrpSpPr>
+        <p:cNvPr id="1" name=""/>
+        <p:cNvGrpSpPr/>
+        <p:nvPr/>
+      </p:nvGrpSpPr>
+      <p:grpSpPr>
+        <a:xfrm>
+          <a:off x="0" y="0"/>
+          <a:ext cx="0" cy="0"/>
+          <a:chOff x="0" y="0"/>
+          <a:chExt cx="0" cy="0"/>
+        </a:xfrm>
+      </p:grpSpPr>
+      <p:sp>
+        <p:nvSpPr>
+          <p:cNvPr id="4" name="Rectangle 3"/>
+          <p:cNvSpPr/>
+          <p:nvPr/>
+        </p:nvSpPr>
+        <p:spPr>
+          <a:xfrm>
+            <a:off x="685800" y="1295401"/>
+            <a:ext cx="1143000" cy="457200"/>
+          </a:xfrm>
+          <a:prstGeom prst="rect">
+            <a:avLst/>
+          </a:prstGeom>
+        </p:spPr>
+        <p:style>
+          <a:lnRef idx="2">
+            <a:schemeClr val="accent1">
+              <a:shade val="50000"/>
+            </a:schemeClr>
+          </a:lnRef>
+          <a:fillRef idx="1">
+            <a:schemeClr val="accent1"/>
+          </a:fillRef>
+          <a:effectRef idx="0">
+            <a:schemeClr val="accent1"/>
+          </a:effectRef>
+          <a:fontRef idx="minor">
+            <a:schemeClr val="lt1"/>
+          </a:fontRef>
+        </p:style>
+        <p:txBody>
+          <a:bodyPr rtlCol="0" anchor="ctr"/>
+          <a:lstStyle/>
+          <a:p>
+            <a:pPr algn="ctr"/>
+            <a:r>
+              <a:rPr kumimoji="1" lang="en-US" dirty="0" smtClean="0"/>
+              <a:t>Tex Unit</a:t>
+            </a:r>
+            <a:endParaRPr kumimoji="1" lang="en-US" dirty="0"/>
+          </a:p>
+        </p:txBody>
+      </p:sp>
+      <p:sp>
+        <p:nvSpPr>
+          <p:cNvPr id="5" name="Rounded Rectangle 4"/>
+          <p:cNvSpPr/>
+          <p:nvPr/>
+        </p:nvSpPr>
+        <p:spPr>
+          <a:xfrm>
+            <a:off x="685800" y="762000"/>
+            <a:ext cx="1143000" cy="381000"/>
+          </a:xfrm>
+          <a:prstGeom prst="roundRect">
+            <a:avLst/>
+          </a:prstGeom>
+        </p:spPr>
+        <p:style>
+          <a:lnRef idx="2">
+            <a:schemeClr val="accent6">
+              <a:shade val="50000"/>
+            </a:schemeClr>
+          </a:lnRef>
+          <a:fillRef idx="1">
+            <a:schemeClr val="accent6"/>
+          </a:fillRef>
+          <a:effectRef idx="0">
+            <a:schemeClr val="accent6"/>
+          </a:effectRef>
+          <a:fontRef idx="minor">
+            <a:schemeClr val="lt1"/>
+          </a:fontRef>
+        </p:style>
+        <p:txBody>
+          <a:bodyPr rtlCol="0" anchor="ctr"/>
+          <a:lstStyle/>
+          <a:p>
+            <a:pPr algn="ctr"/>
+            <a:r>
+              <a:rPr kumimoji="1" lang="en-US" sz="1100" dirty="0" smtClean="0"/>
+              <a:t>Tex Window</a:t>
+            </a:r>
+          </a:p>
+          <a:p>
+            <a:pPr algn="ctr"/>
+            <a:r>
+              <a:rPr lang="en-US" sz="1100" dirty="0" err="1" smtClean="0"/>
+              <a:t>Regs</a:t>
+            </a:r>
+            <a:endParaRPr kumimoji="1" lang="en-US" sz="1100" dirty="0"/>
+          </a:p>
+        </p:txBody>
+      </p:sp>
+      <p:sp>
+        <p:nvSpPr>
+          <p:cNvPr id="6" name="Rounded Rectangle 5"/>
+          <p:cNvSpPr/>
+          <p:nvPr/>
+        </p:nvSpPr>
+        <p:spPr>
+          <a:xfrm>
+            <a:off x="685800" y="76200"/>
+            <a:ext cx="1143000" cy="685800"/>
+          </a:xfrm>
+          <a:prstGeom prst="roundRect">
+            <a:avLst/>
+          </a:prstGeom>
+        </p:spPr>
+        <p:style>
+          <a:lnRef idx="2">
+            <a:schemeClr val="accent6">
+              <a:shade val="50000"/>
+            </a:schemeClr>
+          </a:lnRef>
+          <a:fillRef idx="1">
+            <a:schemeClr val="accent6"/>
+          </a:fillRef>
+          <a:effectRef idx="0">
+            <a:schemeClr val="accent6"/>
+          </a:effectRef>
+          <a:fontRef idx="minor">
+            <a:schemeClr val="lt1"/>
+          </a:fontRef>
+        </p:style>
+        <p:txBody>
+          <a:bodyPr rtlCol="0" anchor="ctr"/>
+          <a:lstStyle/>
+          <a:p>
+            <a:pPr algn="ctr"/>
+            <a:r>
+              <a:rPr kumimoji="1" lang="en-US" sz="1100" dirty="0" smtClean="0"/>
+              <a:t>Tex Base X/Y</a:t>
+            </a:r>
+            <a:br>
+              <a:rPr kumimoji="1" lang="en-US" sz="1100" dirty="0" smtClean="0"/>
+            </a:br>
+            <a:r>
+              <a:rPr kumimoji="1" lang="en-US" sz="1100" dirty="0" smtClean="0"/>
+              <a:t>Tex Format</a:t>
+            </a:r>
+            <a:br>
+              <a:rPr kumimoji="1" lang="en-US" sz="1100" dirty="0" smtClean="0"/>
+            </a:br>
+            <a:r>
+              <a:rPr kumimoji="1" lang="en-US" sz="1100" dirty="0" smtClean="0"/>
+              <a:t>Tex Disable</a:t>
+            </a:r>
+            <a:br>
+              <a:rPr kumimoji="1" lang="en-US" sz="1100" dirty="0" smtClean="0"/>
+            </a:br>
+            <a:r>
+              <a:rPr kumimoji="1" lang="en-US" sz="1100" dirty="0" smtClean="0"/>
+              <a:t>Tex X/Y Flip</a:t>
+            </a:r>
+            <a:endParaRPr kumimoji="1" lang="en-US" sz="1100" dirty="0"/>
+          </a:p>
+        </p:txBody>
+      </p:sp>
+      <p:sp>
+        <p:nvSpPr>
+          <p:cNvPr id="7" name="Down Arrow 6"/>
+          <p:cNvSpPr/>
+          <p:nvPr/>
+        </p:nvSpPr>
+        <p:spPr>
+          <a:xfrm>
+            <a:off x="990600" y="1104124"/>
+            <a:ext cx="533400" cy="228600"/>
+          </a:xfrm>
+          <a:prstGeom prst="downArrow">
+            <a:avLst/>
+          </a:prstGeom>
+        </p:spPr>
+        <p:style>
+          <a:lnRef idx="2">
+            <a:schemeClr val="accent6">
+              <a:shade val="50000"/>
+            </a:schemeClr>
+          </a:lnRef>
+          <a:fillRef idx="1">
+            <a:schemeClr val="accent6"/>
+          </a:fillRef>
+          <a:effectRef idx="0">
+            <a:schemeClr val="accent6"/>
+          </a:effectRef>
+          <a:fontRef idx="minor">
+            <a:schemeClr val="lt1"/>
+          </a:fontRef>
+        </p:style>
+        <p:txBody>
+          <a:bodyPr rtlCol="0" anchor="ctr"/>
+          <a:lstStyle/>
+          <a:p>
+            <a:pPr algn="ctr"/>
+            <a:endParaRPr kumimoji="1" lang="en-US"/>
+          </a:p>
+        </p:txBody>
+      </p:sp>
+      <p:sp>
+        <p:nvSpPr>
+          <p:cNvPr id="8" name="Right Arrow 7"/>
+          <p:cNvSpPr/>
+          <p:nvPr/>
+        </p:nvSpPr>
+        <p:spPr>
+          <a:xfrm>
+            <a:off x="152400" y="1371600"/>
+            <a:ext cx="533400" cy="228600"/>
+          </a:xfrm>
+          <a:prstGeom prst="rightArrow">
+            <a:avLst/>
+          </a:prstGeom>
+        </p:spPr>
+        <p:style>
+          <a:lnRef idx="2">
+            <a:schemeClr val="accent1">
+              <a:shade val="50000"/>
+            </a:schemeClr>
+          </a:lnRef>
+          <a:fillRef idx="1">
+            <a:schemeClr val="accent1"/>
+          </a:fillRef>
+          <a:effectRef idx="0">
+            <a:schemeClr val="accent1"/>
+          </a:effectRef>
+          <a:fontRef idx="minor">
+            <a:schemeClr val="lt1"/>
+          </a:fontRef>
+        </p:style>
+        <p:txBody>
+          <a:bodyPr rtlCol="0" anchor="ctr"/>
+          <a:lstStyle/>
+          <a:p>
+            <a:pPr algn="ctr"/>
+            <a:endParaRPr kumimoji="1" lang="en-US"/>
+          </a:p>
+        </p:txBody>
+      </p:sp>
+      <p:sp>
+        <p:nvSpPr>
+          <p:cNvPr id="9" name="TextBox 8"/>
+          <p:cNvSpPr txBox="1"/>
+          <p:nvPr/>
+        </p:nvSpPr>
+        <p:spPr>
+          <a:xfrm>
+            <a:off x="27993" y="1046586"/>
+            <a:ext cx="652743" cy="430887"/>
+          </a:xfrm>
+          <a:prstGeom prst="rect">
+            <a:avLst/>
+          </a:prstGeom>
+          <a:noFill/>
+        </p:spPr>
+        <p:txBody>
+          <a:bodyPr wrap="none" rtlCol="0">
+            <a:spAutoFit/>
+          </a:bodyPr>
+          <a:lstStyle/>
+          <a:p>
+            <a:r>
+              <a:rPr kumimoji="1" lang="en-US" sz="1100" dirty="0" smtClean="0"/>
+              <a:t>[U,V] P0</a:t>
+            </a:r>
+          </a:p>
+          <a:p>
+            <a:r>
+              <a:rPr lang="en-US" sz="1100" dirty="0" smtClean="0"/>
+              <a:t>[U,V] P1</a:t>
+            </a:r>
+            <a:endParaRPr kumimoji="1" lang="en-US" sz="1100" dirty="0"/>
+          </a:p>
+        </p:txBody>
+      </p:sp>
+      <p:sp>
+        <p:nvSpPr>
+          <p:cNvPr id="10" name="Rectangle 9"/>
+          <p:cNvSpPr/>
+          <p:nvPr/>
+        </p:nvSpPr>
+        <p:spPr>
+          <a:xfrm>
+            <a:off x="2514600" y="1295400"/>
+            <a:ext cx="3657600" cy="2286000"/>
+          </a:xfrm>
+          <a:prstGeom prst="rect">
+            <a:avLst/>
+          </a:prstGeom>
+        </p:spPr>
+        <p:style>
+          <a:lnRef idx="2">
+            <a:schemeClr val="accent1">
+              <a:shade val="50000"/>
+            </a:schemeClr>
+          </a:lnRef>
+          <a:fillRef idx="1">
+            <a:schemeClr val="accent1"/>
+          </a:fillRef>
+          <a:effectRef idx="0">
+            <a:schemeClr val="accent1"/>
+          </a:effectRef>
+          <a:fontRef idx="minor">
+            <a:schemeClr val="lt1"/>
+          </a:fontRef>
+        </p:style>
+        <p:txBody>
+          <a:bodyPr rtlCol="0" anchor="ctr"/>
+          <a:lstStyle/>
+          <a:p>
+            <a:pPr algn="ctr"/>
+            <a:r>
+              <a:rPr kumimoji="1" lang="en-US" sz="1400" dirty="0" smtClean="0"/>
+              <a:t>Pipeline L</a:t>
+            </a:r>
+          </a:p>
+          <a:p>
+            <a:pPr algn="ctr"/>
+            <a:r>
+              <a:rPr lang="en-US" sz="1400" dirty="0" smtClean="0"/>
+              <a:t>Pipeline R</a:t>
+            </a:r>
+            <a:endParaRPr kumimoji="1" lang="en-US" sz="1400" dirty="0" smtClean="0"/>
+          </a:p>
+        </p:txBody>
+      </p:sp>
+      <p:sp>
+        <p:nvSpPr>
+          <p:cNvPr id="11" name="TextBox 10"/>
+          <p:cNvSpPr txBox="1"/>
+          <p:nvPr/>
+        </p:nvSpPr>
+        <p:spPr>
+          <a:xfrm>
+            <a:off x="1752600" y="1066800"/>
+            <a:ext cx="699230" cy="430887"/>
+          </a:xfrm>
+          <a:prstGeom prst="rect">
+            <a:avLst/>
+          </a:prstGeom>
+          <a:noFill/>
+        </p:spPr>
+        <p:txBody>
+          <a:bodyPr wrap="none" rtlCol="0">
+            <a:spAutoFit/>
+          </a:bodyPr>
+          <a:lstStyle/>
+          <a:p>
+            <a:r>
+              <a:rPr kumimoji="1" lang="en-US" sz="1100" dirty="0" smtClean="0"/>
+              <a:t>@TEX P0</a:t>
+            </a:r>
+          </a:p>
+          <a:p>
+            <a:r>
+              <a:rPr lang="en-US" sz="1100" dirty="0" smtClean="0"/>
+              <a:t>@TEX P1</a:t>
+            </a:r>
+            <a:endParaRPr kumimoji="1" lang="en-US" sz="1100" dirty="0"/>
+          </a:p>
+        </p:txBody>
+      </p:sp>
+      <p:sp>
+        <p:nvSpPr>
+          <p:cNvPr id="12" name="Right Arrow 11"/>
+          <p:cNvSpPr/>
+          <p:nvPr/>
+        </p:nvSpPr>
+        <p:spPr>
+          <a:xfrm>
+            <a:off x="1828800" y="1371600"/>
+            <a:ext cx="685800" cy="228600"/>
+          </a:xfrm>
+          <a:prstGeom prst="rightArrow">
+            <a:avLst/>
+          </a:prstGeom>
+        </p:spPr>
+        <p:style>
+          <a:lnRef idx="2">
+            <a:schemeClr val="accent1">
+              <a:shade val="50000"/>
+            </a:schemeClr>
+          </a:lnRef>
+          <a:fillRef idx="1">
+            <a:schemeClr val="accent1"/>
+          </a:fillRef>
+          <a:effectRef idx="0">
+            <a:schemeClr val="accent1"/>
+          </a:effectRef>
+          <a:fontRef idx="minor">
+            <a:schemeClr val="lt1"/>
+          </a:fontRef>
+        </p:style>
+        <p:txBody>
+          <a:bodyPr rtlCol="0" anchor="ctr"/>
+          <a:lstStyle/>
+          <a:p>
+            <a:pPr algn="ctr"/>
+            <a:endParaRPr kumimoji="1" lang="en-US"/>
+          </a:p>
+        </p:txBody>
+      </p:sp>
+      <p:sp>
+        <p:nvSpPr>
+          <p:cNvPr id="13" name="Rounded Rectangle 12"/>
+          <p:cNvSpPr/>
+          <p:nvPr/>
+        </p:nvSpPr>
+        <p:spPr>
+          <a:xfrm>
+            <a:off x="3200400" y="914400"/>
+            <a:ext cx="1066800" cy="228600"/>
+          </a:xfrm>
+          <a:prstGeom prst="roundRect">
+            <a:avLst/>
+          </a:prstGeom>
+        </p:spPr>
+        <p:style>
+          <a:lnRef idx="2">
+            <a:schemeClr val="accent6">
+              <a:shade val="50000"/>
+            </a:schemeClr>
+          </a:lnRef>
+          <a:fillRef idx="1">
+            <a:schemeClr val="accent6"/>
+          </a:fillRef>
+          <a:effectRef idx="0">
+            <a:schemeClr val="accent6"/>
+          </a:effectRef>
+          <a:fontRef idx="minor">
+            <a:schemeClr val="lt1"/>
+          </a:fontRef>
+        </p:style>
+        <p:txBody>
+          <a:bodyPr rtlCol="0" anchor="ctr"/>
+          <a:lstStyle/>
+          <a:p>
+            <a:pPr algn="ctr"/>
+            <a:r>
+              <a:rPr kumimoji="1" lang="en-US" sz="900" dirty="0" smtClean="0"/>
+              <a:t>Tex Format</a:t>
+            </a:r>
+            <a:endParaRPr kumimoji="1" lang="en-US" sz="900" dirty="0"/>
+          </a:p>
+        </p:txBody>
+      </p:sp>
+      <p:sp>
+        <p:nvSpPr>
+          <p:cNvPr id="14" name="Down Arrow 13"/>
+          <p:cNvSpPr/>
+          <p:nvPr/>
+        </p:nvSpPr>
+        <p:spPr>
+          <a:xfrm>
+            <a:off x="3429000" y="1143000"/>
+            <a:ext cx="533400" cy="228600"/>
+          </a:xfrm>
+          <a:prstGeom prst="downArrow">
+            <a:avLst/>
+          </a:prstGeom>
+        </p:spPr>
+        <p:style>
+          <a:lnRef idx="2">
+            <a:schemeClr val="accent6">
+              <a:shade val="50000"/>
+            </a:schemeClr>
+          </a:lnRef>
+          <a:fillRef idx="1">
+            <a:schemeClr val="accent6"/>
+          </a:fillRef>
+          <a:effectRef idx="0">
+            <a:schemeClr val="accent6"/>
+          </a:effectRef>
+          <a:fontRef idx="minor">
+            <a:schemeClr val="lt1"/>
+          </a:fontRef>
+        </p:style>
+        <p:txBody>
+          <a:bodyPr rtlCol="0" anchor="ctr"/>
+          <a:lstStyle/>
+          <a:p>
+            <a:pPr algn="ctr"/>
+            <a:endParaRPr kumimoji="1" lang="en-US"/>
+          </a:p>
+        </p:txBody>
+      </p:sp>
+      <p:sp>
+        <p:nvSpPr>
+          <p:cNvPr id="15" name="Rounded Rectangle 14"/>
+          <p:cNvSpPr/>
+          <p:nvPr/>
+        </p:nvSpPr>
+        <p:spPr>
+          <a:xfrm>
+            <a:off x="3200400" y="685800"/>
+            <a:ext cx="1066800" cy="228600"/>
+          </a:xfrm>
+          <a:prstGeom prst="roundRect">
+            <a:avLst/>
+          </a:prstGeom>
+        </p:spPr>
+        <p:style>
+          <a:lnRef idx="2">
+            <a:schemeClr val="accent6">
+              <a:shade val="50000"/>
+            </a:schemeClr>
+          </a:lnRef>
+          <a:fillRef idx="1">
+            <a:schemeClr val="accent6"/>
+          </a:fillRef>
+          <a:effectRef idx="0">
+            <a:schemeClr val="accent6"/>
+          </a:effectRef>
+          <a:fontRef idx="minor">
+            <a:schemeClr val="lt1"/>
+          </a:fontRef>
+        </p:style>
+        <p:txBody>
+          <a:bodyPr rtlCol="0" anchor="ctr"/>
+          <a:lstStyle/>
+          <a:p>
+            <a:pPr algn="ctr"/>
+            <a:r>
+              <a:rPr kumimoji="1" lang="en-US" sz="900" dirty="0" smtClean="0"/>
+              <a:t>CLUT REG</a:t>
+            </a:r>
+            <a:endParaRPr kumimoji="1" lang="en-US" sz="900" dirty="0"/>
+          </a:p>
+        </p:txBody>
+      </p:sp>
+      <p:sp>
+        <p:nvSpPr>
+          <p:cNvPr id="16" name="TextBox 15"/>
+          <p:cNvSpPr txBox="1"/>
+          <p:nvPr/>
+        </p:nvSpPr>
+        <p:spPr>
+          <a:xfrm>
+            <a:off x="385377" y="1877007"/>
+            <a:ext cx="2098651" cy="261610"/>
+          </a:xfrm>
+          <a:prstGeom prst="rect">
+            <a:avLst/>
+          </a:prstGeom>
+          <a:noFill/>
+        </p:spPr>
+        <p:txBody>
+          <a:bodyPr wrap="none" rtlCol="0">
+            <a:spAutoFit/>
+          </a:bodyPr>
+          <a:lstStyle/>
+          <a:p>
+            <a:r>
+              <a:rPr kumimoji="1" lang="en-US" sz="1100" dirty="0" smtClean="0"/>
+              <a:t>[U,V] P0/P1 LSB[1:0] (4/8 bit TEX)</a:t>
+            </a:r>
+          </a:p>
+        </p:txBody>
+      </p:sp>
+      <p:sp>
+        <p:nvSpPr>
+          <p:cNvPr id="18" name="Bent Arrow 17"/>
+          <p:cNvSpPr/>
+          <p:nvPr/>
+        </p:nvSpPr>
+        <p:spPr>
+          <a:xfrm flipV="1">
+            <a:off x="304800" y="1524000"/>
+            <a:ext cx="2209800" cy="457200"/>
+          </a:xfrm>
+          <a:prstGeom prst="bentArrow">
+            <a:avLst/>
+          </a:prstGeom>
+        </p:spPr>
+        <p:style>
+          <a:lnRef idx="2">
+            <a:schemeClr val="accent1">
+              <a:shade val="50000"/>
+            </a:schemeClr>
+          </a:lnRef>
+          <a:fillRef idx="1">
+            <a:schemeClr val="accent1"/>
+          </a:fillRef>
+          <a:effectRef idx="0">
+            <a:schemeClr val="accent1"/>
+          </a:effectRef>
+          <a:fontRef idx="minor">
+            <a:schemeClr val="lt1"/>
+          </a:fontRef>
+        </p:style>
+        <p:txBody>
+          <a:bodyPr rtlCol="0" anchor="ctr"/>
+          <a:lstStyle/>
+          <a:p>
+            <a:pPr algn="ctr"/>
+            <a:endParaRPr kumimoji="1" lang="en-US">
+              <a:solidFill>
+                <a:schemeClr val="tx1"/>
+              </a:solidFill>
+            </a:endParaRPr>
+          </a:p>
+        </p:txBody>
+      </p:sp>
+      <p:cxnSp>
+        <p:nvCxnSpPr>
+          <p:cNvPr id="19" name="Straight Arrow Connector 18"/>
+          <p:cNvCxnSpPr/>
+          <p:nvPr/>
+        </p:nvCxnSpPr>
+        <p:spPr>
+          <a:xfrm>
+            <a:off x="152400" y="3032803"/>
+            <a:ext cx="2362200" cy="0"/>
+          </a:xfrm>
+          <a:prstGeom prst="straightConnector1">
+            <a:avLst/>
+          </a:prstGeom>
+          <a:ln>
+            <a:tailEnd type="arrow"/>
+          </a:ln>
+        </p:spPr>
+        <p:style>
+          <a:lnRef idx="1">
+            <a:schemeClr val="accent1"/>
+          </a:lnRef>
+          <a:fillRef idx="0">
+            <a:schemeClr val="accent1"/>
+          </a:fillRef>
+          <a:effectRef idx="0">
+            <a:schemeClr val="accent1"/>
+          </a:effectRef>
+          <a:fontRef idx="minor">
+            <a:schemeClr val="tx1"/>
+          </a:fontRef>
+        </p:style>
+      </p:cxnSp>
+      <p:sp>
+        <p:nvSpPr>
+          <p:cNvPr id="24" name="TextBox 23"/>
+          <p:cNvSpPr txBox="1"/>
+          <p:nvPr/>
+        </p:nvSpPr>
+        <p:spPr>
+          <a:xfrm>
+            <a:off x="152400" y="2971800"/>
+            <a:ext cx="822661" cy="261610"/>
+          </a:xfrm>
+          <a:prstGeom prst="rect">
+            <a:avLst/>
+          </a:prstGeom>
+          <a:noFill/>
+        </p:spPr>
+        <p:txBody>
+          <a:bodyPr wrap="none" rtlCol="0">
+            <a:spAutoFit/>
+          </a:bodyPr>
+          <a:lstStyle/>
+          <a:p>
+            <a:r>
+              <a:rPr kumimoji="1" lang="en-US" sz="1100" dirty="0" smtClean="0"/>
+              <a:t>No Texture</a:t>
+            </a:r>
+          </a:p>
+        </p:txBody>
+      </p:sp>
+      <p:sp>
+        <p:nvSpPr>
+          <p:cNvPr id="25" name="Right Arrow 24"/>
+          <p:cNvSpPr/>
+          <p:nvPr/>
+        </p:nvSpPr>
+        <p:spPr>
+          <a:xfrm>
+            <a:off x="152400" y="2133600"/>
+            <a:ext cx="2362200" cy="228600"/>
+          </a:xfrm>
+          <a:prstGeom prst="rightArrow">
+            <a:avLst/>
+          </a:prstGeom>
+        </p:spPr>
+        <p:style>
+          <a:lnRef idx="2">
+            <a:schemeClr val="accent1">
+              <a:shade val="50000"/>
+            </a:schemeClr>
+          </a:lnRef>
+          <a:fillRef idx="1">
+            <a:schemeClr val="accent1"/>
+          </a:fillRef>
+          <a:effectRef idx="0">
+            <a:schemeClr val="accent1"/>
+          </a:effectRef>
+          <a:fontRef idx="minor">
+            <a:schemeClr val="lt1"/>
+          </a:fontRef>
+        </p:style>
+        <p:txBody>
+          <a:bodyPr rtlCol="0" anchor="ctr"/>
+          <a:lstStyle/>
+          <a:p>
+            <a:pPr algn="ctr"/>
+            <a:endParaRPr kumimoji="1" lang="en-US"/>
+          </a:p>
+        </p:txBody>
+      </p:sp>
+      <p:sp>
+        <p:nvSpPr>
+          <p:cNvPr id="26" name="TextBox 25"/>
+          <p:cNvSpPr txBox="1"/>
+          <p:nvPr/>
+        </p:nvSpPr>
+        <p:spPr>
+          <a:xfrm>
+            <a:off x="130634" y="2248676"/>
+            <a:ext cx="2366353" cy="261610"/>
+          </a:xfrm>
+          <a:prstGeom prst="rect">
+            <a:avLst/>
+          </a:prstGeom>
+          <a:noFill/>
+        </p:spPr>
+        <p:txBody>
+          <a:bodyPr wrap="none" rtlCol="0">
+            <a:spAutoFit/>
+          </a:bodyPr>
+          <a:lstStyle/>
+          <a:p>
+            <a:r>
+              <a:rPr kumimoji="1" lang="en-US" sz="1100" dirty="0" smtClean="0"/>
+              <a:t>Pixel Screen X,X+1,Y LSB[1:0] (dither)</a:t>
+            </a:r>
+          </a:p>
+        </p:txBody>
+      </p:sp>
+      <p:sp>
+        <p:nvSpPr>
+          <p:cNvPr id="27" name="Right Arrow 26"/>
+          <p:cNvSpPr/>
+          <p:nvPr/>
+        </p:nvSpPr>
+        <p:spPr>
+          <a:xfrm>
+            <a:off x="152400" y="2438400"/>
+            <a:ext cx="2362200" cy="228600"/>
+          </a:xfrm>
+          <a:prstGeom prst="rightArrow">
+            <a:avLst/>
+          </a:prstGeom>
+        </p:spPr>
+        <p:style>
+          <a:lnRef idx="2">
+            <a:schemeClr val="accent1">
+              <a:shade val="50000"/>
+            </a:schemeClr>
+          </a:lnRef>
+          <a:fillRef idx="1">
+            <a:schemeClr val="accent1"/>
+          </a:fillRef>
+          <a:effectRef idx="0">
+            <a:schemeClr val="accent1"/>
+          </a:effectRef>
+          <a:fontRef idx="minor">
+            <a:schemeClr val="lt1"/>
+          </a:fontRef>
+        </p:style>
+        <p:txBody>
+          <a:bodyPr rtlCol="0" anchor="ctr"/>
+          <a:lstStyle/>
+          <a:p>
+            <a:pPr algn="ctr"/>
+            <a:endParaRPr kumimoji="1" lang="en-US"/>
+          </a:p>
+        </p:txBody>
+      </p:sp>
+      <p:sp>
+        <p:nvSpPr>
+          <p:cNvPr id="28" name="TextBox 27"/>
+          <p:cNvSpPr txBox="1"/>
+          <p:nvPr/>
+        </p:nvSpPr>
+        <p:spPr>
+          <a:xfrm>
+            <a:off x="408993" y="2557790"/>
+            <a:ext cx="1792478" cy="261610"/>
+          </a:xfrm>
+          <a:prstGeom prst="rect">
+            <a:avLst/>
+          </a:prstGeom>
+          <a:noFill/>
+        </p:spPr>
+        <p:txBody>
+          <a:bodyPr wrap="none" rtlCol="0">
+            <a:spAutoFit/>
+          </a:bodyPr>
+          <a:lstStyle/>
+          <a:p>
+            <a:r>
+              <a:rPr kumimoji="1" lang="en-US" sz="1100" dirty="0" smtClean="0"/>
+              <a:t>R/G/B Interp. [9 bit] pix L&amp;R</a:t>
+            </a:r>
+          </a:p>
+        </p:txBody>
+      </p:sp>
+      <p:cxnSp>
+        <p:nvCxnSpPr>
+          <p:cNvPr id="29" name="Straight Arrow Connector 28"/>
+          <p:cNvCxnSpPr/>
+          <p:nvPr/>
+        </p:nvCxnSpPr>
+        <p:spPr>
+          <a:xfrm>
+            <a:off x="152400" y="2819400"/>
+            <a:ext cx="2362200" cy="0"/>
+          </a:xfrm>
+          <a:prstGeom prst="straightConnector1">
+            <a:avLst/>
+          </a:prstGeom>
+          <a:ln w="28575">
+            <a:tailEnd type="arrow"/>
+          </a:ln>
+        </p:spPr>
+        <p:style>
+          <a:lnRef idx="1">
+            <a:schemeClr val="accent1"/>
+          </a:lnRef>
+          <a:fillRef idx="0">
+            <a:schemeClr val="accent1"/>
+          </a:fillRef>
+          <a:effectRef idx="0">
+            <a:schemeClr val="accent1"/>
+          </a:effectRef>
+          <a:fontRef idx="minor">
+            <a:schemeClr val="tx1"/>
+          </a:fontRef>
+        </p:style>
+      </p:cxnSp>
+      <p:sp>
+        <p:nvSpPr>
+          <p:cNvPr id="30" name="TextBox 29"/>
+          <p:cNvSpPr txBox="1"/>
+          <p:nvPr/>
+        </p:nvSpPr>
+        <p:spPr>
+          <a:xfrm>
+            <a:off x="1337418" y="2761862"/>
+            <a:ext cx="1034257" cy="261610"/>
+          </a:xfrm>
+          <a:prstGeom prst="rect">
+            <a:avLst/>
+          </a:prstGeom>
+          <a:noFill/>
+        </p:spPr>
+        <p:txBody>
+          <a:bodyPr wrap="none" rtlCol="0">
+            <a:spAutoFit/>
+          </a:bodyPr>
+          <a:lstStyle/>
+          <a:p>
+            <a:r>
+              <a:rPr kumimoji="1" lang="en-US" sz="1100" dirty="0" smtClean="0"/>
+              <a:t>Valid Pixel L&amp;R</a:t>
+            </a:r>
+          </a:p>
+        </p:txBody>
+      </p:sp>
+      <p:cxnSp>
+        <p:nvCxnSpPr>
+          <p:cNvPr id="31" name="Straight Arrow Connector 30"/>
+          <p:cNvCxnSpPr/>
+          <p:nvPr/>
+        </p:nvCxnSpPr>
+        <p:spPr>
+          <a:xfrm>
+            <a:off x="152400" y="3352800"/>
+            <a:ext cx="2362200" cy="0"/>
+          </a:xfrm>
+          <a:prstGeom prst="straightConnector1">
+            <a:avLst/>
+          </a:prstGeom>
+          <a:ln>
+            <a:headEnd type="arrow" w="med" len="med"/>
+            <a:tailEnd type="none" w="med" len="med"/>
+          </a:ln>
+        </p:spPr>
+        <p:style>
+          <a:lnRef idx="1">
+            <a:schemeClr val="accent1"/>
+          </a:lnRef>
+          <a:fillRef idx="0">
+            <a:schemeClr val="accent1"/>
+          </a:fillRef>
+          <a:effectRef idx="0">
+            <a:schemeClr val="accent1"/>
+          </a:effectRef>
+          <a:fontRef idx="minor">
+            <a:schemeClr val="tx1"/>
+          </a:fontRef>
+        </p:style>
+      </p:cxnSp>
+      <p:cxnSp>
+        <p:nvCxnSpPr>
+          <p:cNvPr id="32" name="Straight Arrow Connector 31"/>
+          <p:cNvCxnSpPr/>
+          <p:nvPr/>
+        </p:nvCxnSpPr>
+        <p:spPr>
+          <a:xfrm>
+            <a:off x="152400" y="3429000"/>
+            <a:ext cx="2362200" cy="0"/>
+          </a:xfrm>
+          <a:prstGeom prst="straightConnector1">
+            <a:avLst/>
+          </a:prstGeom>
+          <a:ln>
+            <a:headEnd type="arrow" w="med" len="med"/>
+            <a:tailEnd type="none" w="med" len="med"/>
+          </a:ln>
+        </p:spPr>
+        <p:style>
+          <a:lnRef idx="1">
+            <a:schemeClr val="accent1"/>
+          </a:lnRef>
+          <a:fillRef idx="0">
+            <a:schemeClr val="accent1"/>
+          </a:fillRef>
+          <a:effectRef idx="0">
+            <a:schemeClr val="accent1"/>
+          </a:effectRef>
+          <a:fontRef idx="minor">
+            <a:schemeClr val="tx1"/>
+          </a:fontRef>
+        </p:style>
+      </p:cxnSp>
+      <p:sp>
+        <p:nvSpPr>
+          <p:cNvPr id="33" name="TextBox 32"/>
+          <p:cNvSpPr txBox="1"/>
+          <p:nvPr/>
+        </p:nvSpPr>
+        <p:spPr>
+          <a:xfrm>
+            <a:off x="1205232" y="3252921"/>
+            <a:ext cx="1354858" cy="261610"/>
+          </a:xfrm>
+          <a:prstGeom prst="rect">
+            <a:avLst/>
+          </a:prstGeom>
+          <a:noFill/>
+        </p:spPr>
+        <p:txBody>
+          <a:bodyPr wrap="none" rtlCol="0">
+            <a:spAutoFit/>
+          </a:bodyPr>
+          <a:lstStyle/>
+          <a:p>
+            <a:r>
+              <a:rPr lang="en-US" sz="1100" dirty="0" smtClean="0"/>
+              <a:t>Send Next Pixel L&amp;R</a:t>
+            </a:r>
+            <a:endParaRPr kumimoji="1" lang="en-US" sz="1100" dirty="0" smtClean="0"/>
+          </a:p>
+        </p:txBody>
+      </p:sp>
+      <p:sp>
+        <p:nvSpPr>
+          <p:cNvPr id="34" name="Rectangle 33"/>
+          <p:cNvSpPr/>
+          <p:nvPr/>
+        </p:nvSpPr>
+        <p:spPr>
+          <a:xfrm>
+            <a:off x="2514600" y="3733800"/>
+            <a:ext cx="1752600" cy="457200"/>
+          </a:xfrm>
+          <a:prstGeom prst="rect">
+            <a:avLst/>
+          </a:prstGeom>
+        </p:spPr>
+        <p:style>
+          <a:lnRef idx="2">
+            <a:schemeClr val="accent1">
+              <a:shade val="50000"/>
+            </a:schemeClr>
+          </a:lnRef>
+          <a:fillRef idx="1">
+            <a:schemeClr val="accent1"/>
+          </a:fillRef>
+          <a:effectRef idx="0">
+            <a:schemeClr val="accent1"/>
+          </a:effectRef>
+          <a:fontRef idx="minor">
+            <a:schemeClr val="lt1"/>
+          </a:fontRef>
+        </p:style>
+        <p:txBody>
+          <a:bodyPr rtlCol="0" anchor="ctr"/>
+          <a:lstStyle/>
+          <a:p>
+            <a:pPr algn="ctr"/>
+            <a:r>
+              <a:rPr kumimoji="1" lang="en-US" dirty="0" smtClean="0"/>
+              <a:t>TEX$</a:t>
+            </a:r>
+            <a:endParaRPr kumimoji="1" lang="en-US" dirty="0"/>
+          </a:p>
+        </p:txBody>
+      </p:sp>
+      <p:sp>
+        <p:nvSpPr>
+          <p:cNvPr id="35" name="Rectangle 34"/>
+          <p:cNvSpPr/>
+          <p:nvPr/>
+        </p:nvSpPr>
+        <p:spPr>
+          <a:xfrm>
+            <a:off x="4419600" y="3733800"/>
+            <a:ext cx="1752600" cy="457200"/>
+          </a:xfrm>
+          <a:prstGeom prst="rect">
+            <a:avLst/>
+          </a:prstGeom>
+        </p:spPr>
+        <p:style>
+          <a:lnRef idx="2">
+            <a:schemeClr val="accent1">
+              <a:shade val="50000"/>
+            </a:schemeClr>
+          </a:lnRef>
+          <a:fillRef idx="1">
+            <a:schemeClr val="accent1"/>
+          </a:fillRef>
+          <a:effectRef idx="0">
+            <a:schemeClr val="accent1"/>
+          </a:effectRef>
+          <a:fontRef idx="minor">
+            <a:schemeClr val="lt1"/>
+          </a:fontRef>
+        </p:style>
+        <p:txBody>
+          <a:bodyPr rtlCol="0" anchor="ctr"/>
+          <a:lstStyle/>
+          <a:p>
+            <a:pPr algn="ctr"/>
+            <a:r>
+              <a:rPr kumimoji="1" lang="en-US" dirty="0" smtClean="0"/>
+              <a:t>CLUT$</a:t>
+            </a:r>
+            <a:endParaRPr kumimoji="1" lang="en-US" dirty="0"/>
+          </a:p>
+        </p:txBody>
+      </p:sp>
+      <p:sp>
+        <p:nvSpPr>
+          <p:cNvPr id="37" name="Rectangle 36"/>
+          <p:cNvSpPr/>
+          <p:nvPr/>
+        </p:nvSpPr>
+        <p:spPr>
+          <a:xfrm rot="5400000">
+            <a:off x="5867400" y="2895600"/>
+            <a:ext cx="1066800" cy="304800"/>
+          </a:xfrm>
+          <a:prstGeom prst="rect">
+            <a:avLst/>
+          </a:prstGeom>
+        </p:spPr>
+        <p:style>
+          <a:lnRef idx="2">
+            <a:schemeClr val="accent1">
+              <a:shade val="50000"/>
+            </a:schemeClr>
+          </a:lnRef>
+          <a:fillRef idx="1">
+            <a:schemeClr val="accent1"/>
+          </a:fillRef>
+          <a:effectRef idx="0">
+            <a:schemeClr val="accent1"/>
+          </a:effectRef>
+          <a:fontRef idx="minor">
+            <a:schemeClr val="lt1"/>
+          </a:fontRef>
+        </p:style>
+        <p:txBody>
+          <a:bodyPr rtlCol="0" anchor="ctr"/>
+          <a:lstStyle/>
+          <a:p>
+            <a:pPr algn="ctr"/>
+            <a:r>
+              <a:rPr kumimoji="1" lang="en-US" sz="1600" dirty="0" smtClean="0"/>
+              <a:t>Shading R</a:t>
+            </a:r>
+          </a:p>
+        </p:txBody>
+      </p:sp>
+      <p:sp>
+        <p:nvSpPr>
+          <p:cNvPr id="38" name="Rectangle 37"/>
+          <p:cNvSpPr/>
+          <p:nvPr/>
+        </p:nvSpPr>
+        <p:spPr>
+          <a:xfrm rot="5400000">
+            <a:off x="5867400" y="1676400"/>
+            <a:ext cx="1066800" cy="304800"/>
+          </a:xfrm>
+          <a:prstGeom prst="rect">
+            <a:avLst/>
+          </a:prstGeom>
+        </p:spPr>
+        <p:style>
+          <a:lnRef idx="2">
+            <a:schemeClr val="accent1">
+              <a:shade val="50000"/>
+            </a:schemeClr>
+          </a:lnRef>
+          <a:fillRef idx="1">
+            <a:schemeClr val="accent1"/>
+          </a:fillRef>
+          <a:effectRef idx="0">
+            <a:schemeClr val="accent1"/>
+          </a:effectRef>
+          <a:fontRef idx="minor">
+            <a:schemeClr val="lt1"/>
+          </a:fontRef>
+        </p:style>
+        <p:txBody>
+          <a:bodyPr rtlCol="0" anchor="ctr"/>
+          <a:lstStyle/>
+          <a:p>
+            <a:pPr algn="ctr"/>
+            <a:r>
+              <a:rPr kumimoji="1" lang="en-US" sz="1600" dirty="0" smtClean="0"/>
+              <a:t>Shading L</a:t>
+            </a:r>
+          </a:p>
+        </p:txBody>
+      </p:sp>
+      <p:sp>
+        <p:nvSpPr>
+          <p:cNvPr id="39" name="Rectangle 38"/>
+          <p:cNvSpPr/>
+          <p:nvPr/>
+        </p:nvSpPr>
+        <p:spPr>
+          <a:xfrm rot="5400000">
+            <a:off x="6248400" y="1676400"/>
+            <a:ext cx="1066800" cy="304800"/>
+          </a:xfrm>
+          <a:prstGeom prst="rect">
+            <a:avLst/>
+          </a:prstGeom>
+        </p:spPr>
+        <p:style>
+          <a:lnRef idx="2">
+            <a:schemeClr val="accent1">
+              <a:shade val="50000"/>
+            </a:schemeClr>
+          </a:lnRef>
+          <a:fillRef idx="1">
+            <a:schemeClr val="accent1"/>
+          </a:fillRef>
+          <a:effectRef idx="0">
+            <a:schemeClr val="accent1"/>
+          </a:effectRef>
+          <a:fontRef idx="minor">
+            <a:schemeClr val="lt1"/>
+          </a:fontRef>
+        </p:style>
+        <p:txBody>
+          <a:bodyPr rtlCol="0" anchor="ctr"/>
+          <a:lstStyle/>
+          <a:p>
+            <a:pPr algn="ctr"/>
+            <a:r>
+              <a:rPr kumimoji="1" lang="en-US" sz="1600" dirty="0" smtClean="0"/>
+              <a:t>Blend L</a:t>
+            </a:r>
+          </a:p>
+        </p:txBody>
+      </p:sp>
+      <p:sp>
+        <p:nvSpPr>
+          <p:cNvPr id="40" name="Rectangle 39"/>
+          <p:cNvSpPr/>
+          <p:nvPr/>
+        </p:nvSpPr>
+        <p:spPr>
+          <a:xfrm rot="5400000">
+            <a:off x="6248400" y="2895600"/>
+            <a:ext cx="1066800" cy="304800"/>
+          </a:xfrm>
+          <a:prstGeom prst="rect">
+            <a:avLst/>
+          </a:prstGeom>
+        </p:spPr>
+        <p:style>
+          <a:lnRef idx="2">
+            <a:schemeClr val="accent1">
+              <a:shade val="50000"/>
+            </a:schemeClr>
+          </a:lnRef>
+          <a:fillRef idx="1">
+            <a:schemeClr val="accent1"/>
+          </a:fillRef>
+          <a:effectRef idx="0">
+            <a:schemeClr val="accent1"/>
+          </a:effectRef>
+          <a:fontRef idx="minor">
+            <a:schemeClr val="lt1"/>
+          </a:fontRef>
+        </p:style>
+        <p:txBody>
+          <a:bodyPr rtlCol="0" anchor="ctr"/>
+          <a:lstStyle/>
+          <a:p>
+            <a:pPr algn="ctr"/>
+            <a:r>
+              <a:rPr kumimoji="1" lang="en-US" sz="1600" dirty="0" smtClean="0"/>
+              <a:t>Blend R</a:t>
+            </a:r>
+          </a:p>
+        </p:txBody>
+      </p:sp>
+      <p:sp>
+        <p:nvSpPr>
+          <p:cNvPr id="41" name="Rectangle 40"/>
+          <p:cNvSpPr/>
+          <p:nvPr/>
+        </p:nvSpPr>
+        <p:spPr>
+          <a:xfrm rot="5400000">
+            <a:off x="6629400" y="2895600"/>
+            <a:ext cx="1066800" cy="304800"/>
+          </a:xfrm>
+          <a:prstGeom prst="rect">
+            <a:avLst/>
+          </a:prstGeom>
+        </p:spPr>
+        <p:style>
+          <a:lnRef idx="2">
+            <a:schemeClr val="accent1">
+              <a:shade val="50000"/>
+            </a:schemeClr>
+          </a:lnRef>
+          <a:fillRef idx="1">
+            <a:schemeClr val="accent1"/>
+          </a:fillRef>
+          <a:effectRef idx="0">
+            <a:schemeClr val="accent1"/>
+          </a:effectRef>
+          <a:fontRef idx="minor">
+            <a:schemeClr val="lt1"/>
+          </a:fontRef>
+        </p:style>
+        <p:txBody>
+          <a:bodyPr rtlCol="0" anchor="ctr"/>
+          <a:lstStyle/>
+          <a:p>
+            <a:pPr algn="ctr"/>
+            <a:r>
+              <a:rPr kumimoji="1" lang="en-US" sz="1600" dirty="0" smtClean="0"/>
+              <a:t>Dither R</a:t>
+            </a:r>
+          </a:p>
+        </p:txBody>
+      </p:sp>
+      <p:sp>
+        <p:nvSpPr>
+          <p:cNvPr id="42" name="Rectangle 41"/>
+          <p:cNvSpPr/>
+          <p:nvPr/>
+        </p:nvSpPr>
+        <p:spPr>
+          <a:xfrm rot="5400000">
+            <a:off x="6629400" y="1676400"/>
+            <a:ext cx="1066800" cy="304800"/>
+          </a:xfrm>
+          <a:prstGeom prst="rect">
+            <a:avLst/>
+          </a:prstGeom>
+        </p:spPr>
+        <p:style>
+          <a:lnRef idx="2">
+            <a:schemeClr val="accent1">
+              <a:shade val="50000"/>
+            </a:schemeClr>
+          </a:lnRef>
+          <a:fillRef idx="1">
+            <a:schemeClr val="accent1"/>
+          </a:fillRef>
+          <a:effectRef idx="0">
+            <a:schemeClr val="accent1"/>
+          </a:effectRef>
+          <a:fontRef idx="minor">
+            <a:schemeClr val="lt1"/>
+          </a:fontRef>
+        </p:style>
+        <p:txBody>
+          <a:bodyPr rtlCol="0" anchor="ctr"/>
+          <a:lstStyle/>
+          <a:p>
+            <a:pPr algn="ctr"/>
+            <a:r>
+              <a:rPr kumimoji="1" lang="en-US" sz="1600" dirty="0" smtClean="0"/>
+              <a:t>Dither L</a:t>
+            </a:r>
           </a:p>
         </p:txBody>
       </p:sp>

</xml_diff>